<commit_message>
updates to power point file
</commit_message>
<xml_diff>
--- a/Clay/Novel_Corona_Virus_2019.pptx
+++ b/Clay/Novel_Corona_Virus_2019.pptx
@@ -4494,7 +4494,7 @@
         <p:spPr>
           <a:xfrm>
             <a:off x="483393" y="2217835"/>
-            <a:ext cx="11225213" cy="2031325"/>
+            <a:ext cx="11225213" cy="2893100"/>
           </a:xfrm>
           <a:prstGeom prst="rect">
             <a:avLst/>
@@ -4538,6 +4538,33 @@
               <a:t>https://www.kaggle.com/vaishnavivenkatesan/world-population</a:t>
             </a:r>
             <a:endParaRPr lang="en-US" sz="1400" dirty="0"/>
+          </a:p>
+          <a:p>
+            <a:endParaRPr lang="en-US" sz="1400" dirty="0">
+              <a:hlinkClick r:id="rId4"/>
+            </a:endParaRPr>
+          </a:p>
+          <a:p>
+            <a:r>
+              <a:rPr lang="en-US" sz="1400" dirty="0"/>
+              <a:t>World Vaccinations </a:t>
+            </a:r>
+          </a:p>
+          <a:p>
+            <a:r>
+              <a:rPr lang="en-US" sz="1400" dirty="0">
+                <a:hlinkClick r:id="rId4"/>
+              </a:rPr>
+              <a:t>https://www.kaggle.com/xholisilemantshongo/vaccination-progress</a:t>
+            </a:r>
+          </a:p>
+          <a:p>
+            <a:r>
+              <a:rPr lang="en-US" sz="1400" dirty="0">
+                <a:hlinkClick r:id="rId4"/>
+              </a:rPr>
+              <a:t>https://www.kaggle.com/deblina00/insights-on-eda-of-covid19-world-vaccination</a:t>
+            </a:r>
           </a:p>
           <a:p>
             <a:endParaRPr lang="en-US" sz="1400" dirty="0">

</xml_diff>

<commit_message>
udates to the powerpoint project file _ two slides from Revathi have been added
</commit_message>
<xml_diff>
--- a/Clay/Novel_Corona_Virus_2019.pptx
+++ b/Clay/Novel_Corona_Virus_2019.pptx
@@ -5,21 +5,26 @@
     <p:sldMasterId id="2147483648" r:id="rId1"/>
   </p:sldMasterIdLst>
   <p:notesMasterIdLst>
-    <p:notesMasterId r:id="rId11"/>
+    <p:notesMasterId r:id="rId16"/>
   </p:notesMasterIdLst>
   <p:handoutMasterIdLst>
-    <p:handoutMasterId r:id="rId12"/>
+    <p:handoutMasterId r:id="rId17"/>
   </p:handoutMasterIdLst>
   <p:sldIdLst>
     <p:sldId id="256" r:id="rId2"/>
     <p:sldId id="257" r:id="rId3"/>
     <p:sldId id="258" r:id="rId4"/>
     <p:sldId id="259" r:id="rId5"/>
-    <p:sldId id="260" r:id="rId6"/>
-    <p:sldId id="263" r:id="rId7"/>
-    <p:sldId id="261" r:id="rId8"/>
-    <p:sldId id="262" r:id="rId9"/>
+    <p:sldId id="261" r:id="rId6"/>
+    <p:sldId id="262" r:id="rId7"/>
+    <p:sldId id="260" r:id="rId8"/>
+    <p:sldId id="263" r:id="rId9"/>
     <p:sldId id="264" r:id="rId10"/>
+    <p:sldId id="269" r:id="rId11"/>
+    <p:sldId id="265" r:id="rId12"/>
+    <p:sldId id="266" r:id="rId13"/>
+    <p:sldId id="268" r:id="rId14"/>
+    <p:sldId id="267" r:id="rId15"/>
   </p:sldIdLst>
   <p:sldSz cx="12192000" cy="6858000"/>
   <p:notesSz cx="6858000" cy="9144000"/>
@@ -3923,13 +3928,13 @@
         </p:nvSpPr>
         <p:spPr>
           <a:xfrm>
-            <a:off x="1457324" y="1774032"/>
-            <a:ext cx="9953625" cy="2817812"/>
+            <a:off x="1187358" y="2009163"/>
+            <a:ext cx="9953625" cy="3329191"/>
           </a:xfrm>
         </p:spPr>
         <p:txBody>
           <a:bodyPr>
-            <a:normAutofit lnSpcReduction="10000"/>
+            <a:normAutofit fontScale="92500" lnSpcReduction="10000"/>
           </a:bodyPr>
           <a:lstStyle/>
           <a:p>
@@ -3941,9 +3946,13 @@
           </a:p>
           <a:p>
             <a:pPr algn="l"/>
+            <a:endParaRPr lang="en-US" sz="2800" dirty="0"/>
+          </a:p>
+          <a:p>
+            <a:pPr algn="l"/>
             <a:r>
               <a:rPr lang="en-US" sz="2800" dirty="0"/>
-              <a:t>	Julio</a:t>
+              <a:t>	Julio Montano</a:t>
             </a:r>
           </a:p>
           <a:p>
@@ -4017,7 +4026,7 @@
           <a:lstStyle/>
           <a:p>
             <a:r>
-              <a:rPr lang="en-US" sz="4400" dirty="0"/>
+              <a:rPr lang="en-US" sz="4400" b="1" dirty="0"/>
               <a:t>Novel Corona Virus 2019</a:t>
             </a:r>
             <a:br>
@@ -4119,6 +4128,1884 @@
     <p:extLst>
       <p:ext uri="{BB962C8B-B14F-4D97-AF65-F5344CB8AC3E}">
         <p14:creationId xmlns:p14="http://schemas.microsoft.com/office/powerpoint/2010/main" val="1354158614"/>
+      </p:ext>
+    </p:extLst>
+  </p:cSld>
+  <p:clrMapOvr>
+    <a:masterClrMapping/>
+  </p:clrMapOvr>
+</p:sld>
+</file>
+
+<file path=ppt/slides/slide10.xml><?xml version="1.0" encoding="utf-8"?>
+<p:sld xmlns:a="http://schemas.openxmlformats.org/drawingml/2006/main" xmlns:r="http://schemas.openxmlformats.org/officeDocument/2006/relationships" xmlns:p="http://schemas.openxmlformats.org/presentationml/2006/main">
+  <p:cSld>
+    <p:spTree>
+      <p:nvGrpSpPr>
+        <p:cNvPr id="1" name=""/>
+        <p:cNvGrpSpPr/>
+        <p:nvPr/>
+      </p:nvGrpSpPr>
+      <p:grpSpPr>
+        <a:xfrm>
+          <a:off x="0" y="0"/>
+          <a:ext cx="0" cy="0"/>
+          <a:chOff x="0" y="0"/>
+          <a:chExt cx="0" cy="0"/>
+        </a:xfrm>
+      </p:grpSpPr>
+      <p:sp>
+        <p:nvSpPr>
+          <p:cNvPr id="4" name="Title 3">
+            <a:extLst>
+              <a:ext uri="{FF2B5EF4-FFF2-40B4-BE49-F238E27FC236}">
+                <a16:creationId xmlns:a16="http://schemas.microsoft.com/office/drawing/2014/main" id="{8DB41184-8C94-46D3-9D80-4AC9E806E8D5}"/>
+              </a:ext>
+            </a:extLst>
+          </p:cNvPr>
+          <p:cNvSpPr>
+            <a:spLocks noGrp="1"/>
+          </p:cNvSpPr>
+          <p:nvPr>
+            <p:ph type="title"/>
+          </p:nvPr>
+        </p:nvSpPr>
+        <p:spPr>
+          <a:xfrm>
+            <a:off x="838199" y="40720"/>
+            <a:ext cx="10515600" cy="1111250"/>
+          </a:xfrm>
+        </p:spPr>
+        <p:txBody>
+          <a:bodyPr>
+            <a:normAutofit/>
+          </a:bodyPr>
+          <a:lstStyle/>
+          <a:p>
+            <a:pPr algn="ctr"/>
+            <a:r>
+              <a:rPr lang="en-US" sz="4000" dirty="0"/>
+              <a:t>Covid-19 Countries first to report Covid 19 </a:t>
+            </a:r>
+          </a:p>
+        </p:txBody>
+      </p:sp>
+      <p:sp>
+        <p:nvSpPr>
+          <p:cNvPr id="7" name="Footer Placeholder 6">
+            <a:extLst>
+              <a:ext uri="{FF2B5EF4-FFF2-40B4-BE49-F238E27FC236}">
+                <a16:creationId xmlns:a16="http://schemas.microsoft.com/office/drawing/2014/main" id="{840787EF-019F-4D4A-9C20-A253BA226D98}"/>
+              </a:ext>
+            </a:extLst>
+          </p:cNvPr>
+          <p:cNvSpPr>
+            <a:spLocks noGrp="1"/>
+          </p:cNvSpPr>
+          <p:nvPr>
+            <p:ph type="ftr" sz="quarter" idx="11"/>
+          </p:nvPr>
+        </p:nvSpPr>
+        <p:spPr/>
+        <p:txBody>
+          <a:bodyPr/>
+          <a:lstStyle/>
+          <a:p>
+            <a:r>
+              <a:rPr lang="en-US"/>
+              <a:t>https://github.com/makbarish/Grp5_Project1_Covid19</a:t>
+            </a:r>
+          </a:p>
+        </p:txBody>
+      </p:sp>
+      <p:sp>
+        <p:nvSpPr>
+          <p:cNvPr id="6" name="TextBox 5">
+            <a:extLst>
+              <a:ext uri="{FF2B5EF4-FFF2-40B4-BE49-F238E27FC236}">
+                <a16:creationId xmlns:a16="http://schemas.microsoft.com/office/drawing/2014/main" id="{A03FECEA-47C1-4757-8518-90C44BCC97A4}"/>
+              </a:ext>
+            </a:extLst>
+          </p:cNvPr>
+          <p:cNvSpPr txBox="1"/>
+          <p:nvPr/>
+        </p:nvSpPr>
+        <p:spPr>
+          <a:xfrm>
+            <a:off x="838199" y="959933"/>
+            <a:ext cx="10191750" cy="646331"/>
+          </a:xfrm>
+          <a:prstGeom prst="rect">
+            <a:avLst/>
+          </a:prstGeom>
+          <a:noFill/>
+        </p:spPr>
+        <p:txBody>
+          <a:bodyPr wrap="square" rtlCol="0">
+            <a:spAutoFit/>
+          </a:bodyPr>
+          <a:lstStyle/>
+          <a:p>
+            <a:pPr algn="ctr"/>
+            <a:r>
+              <a:rPr lang="en-US" dirty="0"/>
+              <a:t>On 01/22/2020, China was the first Country to report 500+ covid 19 cases to the World Health Organization.  As of 4/30/2020, the total confirmed cases in China was 102k </a:t>
+            </a:r>
+          </a:p>
+        </p:txBody>
+      </p:sp>
+      <p:sp>
+        <p:nvSpPr>
+          <p:cNvPr id="9" name="Rectangle 1">
+            <a:extLst>
+              <a:ext uri="{FF2B5EF4-FFF2-40B4-BE49-F238E27FC236}">
+                <a16:creationId xmlns:a16="http://schemas.microsoft.com/office/drawing/2014/main" id="{2994FD54-5FD0-446D-B6E6-D7BB6A322352}"/>
+              </a:ext>
+            </a:extLst>
+          </p:cNvPr>
+          <p:cNvSpPr>
+            <a:spLocks noChangeArrowheads="1"/>
+          </p:cNvSpPr>
+          <p:nvPr/>
+        </p:nvSpPr>
+        <p:spPr bwMode="auto">
+          <a:xfrm>
+            <a:off x="1619247" y="5792433"/>
+            <a:ext cx="9410702" cy="666785"/>
+          </a:xfrm>
+          <a:prstGeom prst="rect">
+            <a:avLst/>
+          </a:prstGeom>
+          <a:solidFill>
+            <a:srgbClr val="FFFFFF"/>
+          </a:solidFill>
+          <a:ln>
+            <a:noFill/>
+          </a:ln>
+          <a:effectLst/>
+          <a:extLst>
+            <a:ext uri="{91240B29-F687-4F45-9708-019B960494DF}">
+              <a14:hiddenLine xmlns:a14="http://schemas.microsoft.com/office/drawing/2010/main" w="9525">
+                <a:solidFill>
+                  <a:schemeClr val="tx1"/>
+                </a:solidFill>
+                <a:miter lim="800000"/>
+                <a:headEnd/>
+                <a:tailEnd/>
+              </a14:hiddenLine>
+            </a:ext>
+            <a:ext uri="{AF507438-7753-43E0-B8FC-AC1667EBCBE1}">
+              <a14:hiddenEffects xmlns:a14="http://schemas.microsoft.com/office/drawing/2010/main">
+                <a:effectLst>
+                  <a:outerShdw dist="35921" dir="2700000" algn="ctr" rotWithShape="0">
+                    <a:schemeClr val="bg2"/>
+                  </a:outerShdw>
+                </a:effectLst>
+              </a14:hiddenEffects>
+            </a:ext>
+          </a:extLst>
+        </p:spPr>
+        <p:txBody>
+          <a:bodyPr vert="horz" wrap="square" lIns="0" tIns="101568" rIns="0" bIns="101568" numCol="1" anchor="ctr" anchorCtr="0" compatLnSpc="1">
+            <a:prstTxWarp prst="textNoShape">
+              <a:avLst/>
+            </a:prstTxWarp>
+            <a:spAutoFit/>
+          </a:bodyPr>
+          <a:lstStyle>
+            <a:lvl1pPr eaLnBrk="0" fontAlgn="base" hangingPunct="0">
+              <a:spcBef>
+                <a:spcPct val="0"/>
+              </a:spcBef>
+              <a:spcAft>
+                <a:spcPct val="0"/>
+              </a:spcAft>
+              <a:defRPr>
+                <a:solidFill>
+                  <a:schemeClr val="tx1"/>
+                </a:solidFill>
+                <a:latin typeface="Arial" panose="020B0604020202020204" pitchFamily="34" charset="0"/>
+              </a:defRPr>
+            </a:lvl1pPr>
+            <a:lvl2pPr eaLnBrk="0" fontAlgn="base" hangingPunct="0">
+              <a:spcBef>
+                <a:spcPct val="0"/>
+              </a:spcBef>
+              <a:spcAft>
+                <a:spcPct val="0"/>
+              </a:spcAft>
+              <a:defRPr>
+                <a:solidFill>
+                  <a:schemeClr val="tx1"/>
+                </a:solidFill>
+                <a:latin typeface="Arial" panose="020B0604020202020204" pitchFamily="34" charset="0"/>
+              </a:defRPr>
+            </a:lvl2pPr>
+            <a:lvl3pPr eaLnBrk="0" fontAlgn="base" hangingPunct="0">
+              <a:spcBef>
+                <a:spcPct val="0"/>
+              </a:spcBef>
+              <a:spcAft>
+                <a:spcPct val="0"/>
+              </a:spcAft>
+              <a:defRPr>
+                <a:solidFill>
+                  <a:schemeClr val="tx1"/>
+                </a:solidFill>
+                <a:latin typeface="Arial" panose="020B0604020202020204" pitchFamily="34" charset="0"/>
+              </a:defRPr>
+            </a:lvl3pPr>
+            <a:lvl4pPr eaLnBrk="0" fontAlgn="base" hangingPunct="0">
+              <a:spcBef>
+                <a:spcPct val="0"/>
+              </a:spcBef>
+              <a:spcAft>
+                <a:spcPct val="0"/>
+              </a:spcAft>
+              <a:defRPr>
+                <a:solidFill>
+                  <a:schemeClr val="tx1"/>
+                </a:solidFill>
+                <a:latin typeface="Arial" panose="020B0604020202020204" pitchFamily="34" charset="0"/>
+              </a:defRPr>
+            </a:lvl4pPr>
+            <a:lvl5pPr eaLnBrk="0" fontAlgn="base" hangingPunct="0">
+              <a:spcBef>
+                <a:spcPct val="0"/>
+              </a:spcBef>
+              <a:spcAft>
+                <a:spcPct val="0"/>
+              </a:spcAft>
+              <a:defRPr>
+                <a:solidFill>
+                  <a:schemeClr val="tx1"/>
+                </a:solidFill>
+                <a:latin typeface="Arial" panose="020B0604020202020204" pitchFamily="34" charset="0"/>
+              </a:defRPr>
+            </a:lvl5pPr>
+            <a:lvl6pPr eaLnBrk="0" fontAlgn="base" hangingPunct="0">
+              <a:spcBef>
+                <a:spcPct val="0"/>
+              </a:spcBef>
+              <a:spcAft>
+                <a:spcPct val="0"/>
+              </a:spcAft>
+              <a:defRPr>
+                <a:solidFill>
+                  <a:schemeClr val="tx1"/>
+                </a:solidFill>
+                <a:latin typeface="Arial" panose="020B0604020202020204" pitchFamily="34" charset="0"/>
+              </a:defRPr>
+            </a:lvl6pPr>
+            <a:lvl7pPr eaLnBrk="0" fontAlgn="base" hangingPunct="0">
+              <a:spcBef>
+                <a:spcPct val="0"/>
+              </a:spcBef>
+              <a:spcAft>
+                <a:spcPct val="0"/>
+              </a:spcAft>
+              <a:defRPr>
+                <a:solidFill>
+                  <a:schemeClr val="tx1"/>
+                </a:solidFill>
+                <a:latin typeface="Arial" panose="020B0604020202020204" pitchFamily="34" charset="0"/>
+              </a:defRPr>
+            </a:lvl7pPr>
+            <a:lvl8pPr eaLnBrk="0" fontAlgn="base" hangingPunct="0">
+              <a:spcBef>
+                <a:spcPct val="0"/>
+              </a:spcBef>
+              <a:spcAft>
+                <a:spcPct val="0"/>
+              </a:spcAft>
+              <a:defRPr>
+                <a:solidFill>
+                  <a:schemeClr val="tx1"/>
+                </a:solidFill>
+                <a:latin typeface="Arial" panose="020B0604020202020204" pitchFamily="34" charset="0"/>
+              </a:defRPr>
+            </a:lvl8pPr>
+            <a:lvl9pPr eaLnBrk="0" fontAlgn="base" hangingPunct="0">
+              <a:spcBef>
+                <a:spcPct val="0"/>
+              </a:spcBef>
+              <a:spcAft>
+                <a:spcPct val="0"/>
+              </a:spcAft>
+              <a:defRPr>
+                <a:solidFill>
+                  <a:schemeClr val="tx1"/>
+                </a:solidFill>
+                <a:latin typeface="Arial" panose="020B0604020202020204" pitchFamily="34" charset="0"/>
+              </a:defRPr>
+            </a:lvl9pPr>
+          </a:lstStyle>
+          <a:p>
+            <a:pPr marL="0" marR="0" lvl="0" indent="0" algn="l" defTabSz="914400" rtl="0" eaLnBrk="0" fontAlgn="base" latinLnBrk="0" hangingPunct="0">
+              <a:lnSpc>
+                <a:spcPct val="100000"/>
+              </a:lnSpc>
+              <a:spcBef>
+                <a:spcPct val="0"/>
+              </a:spcBef>
+              <a:spcAft>
+                <a:spcPct val="0"/>
+              </a:spcAft>
+              <a:buClrTx/>
+              <a:buSzTx/>
+              <a:buFontTx/>
+              <a:buNone/>
+              <a:tabLst/>
+            </a:pPr>
+            <a:r>
+              <a:rPr lang="en-US" altLang="en-US" sz="1000" dirty="0">
+                <a:latin typeface="Inter"/>
+              </a:rPr>
+              <a:t>Comment from the </a:t>
+            </a:r>
+            <a:r>
+              <a:rPr kumimoji="0" lang="en-US" altLang="en-US" sz="1000" b="0" i="0" u="none" strike="noStrike" cap="none" normalizeH="0" baseline="0" dirty="0">
+                <a:ln>
+                  <a:noFill/>
+                </a:ln>
+                <a:solidFill>
+                  <a:srgbClr val="008ABC"/>
+                </a:solidFill>
+                <a:effectLst/>
+                <a:latin typeface="Inter"/>
+                <a:hlinkClick r:id="rId2"/>
+              </a:rPr>
+              <a:t>World Health Organization</a:t>
+            </a:r>
+            <a:r>
+              <a:rPr kumimoji="0" lang="en-US" altLang="en-US" sz="1000" b="0" i="0" u="none" strike="noStrike" cap="none" normalizeH="0" baseline="0" dirty="0">
+                <a:ln>
+                  <a:noFill/>
+                </a:ln>
+                <a:solidFill>
+                  <a:schemeClr val="tx1"/>
+                </a:solidFill>
+                <a:effectLst/>
+                <a:latin typeface="Inter"/>
+              </a:rPr>
+              <a:t> : On 31 December 2019, WHO was alerted to several cases of pneumonia in Wuhan City, Hubei Province of China.</a:t>
+            </a:r>
+          </a:p>
+          <a:p>
+            <a:r>
+              <a:rPr lang="en-US" sz="1000" b="0" i="0" dirty="0">
+                <a:effectLst/>
+                <a:latin typeface="Inter"/>
+              </a:rPr>
+              <a:t>Note: 2019 Novel Coronavirus (2019-nCoV) is a virus (more specifically, a coronavirus) identified as the cause of an outbreak of respiratory illness first detected in Wuhan, China. </a:t>
+            </a:r>
+            <a:endParaRPr lang="en-US" sz="1000" dirty="0"/>
+          </a:p>
+          <a:p>
+            <a:pPr marL="0" marR="0" lvl="0" indent="0" algn="l" defTabSz="914400" rtl="0" eaLnBrk="0" fontAlgn="base" latinLnBrk="0" hangingPunct="0">
+              <a:lnSpc>
+                <a:spcPct val="100000"/>
+              </a:lnSpc>
+              <a:spcBef>
+                <a:spcPct val="0"/>
+              </a:spcBef>
+              <a:spcAft>
+                <a:spcPct val="0"/>
+              </a:spcAft>
+              <a:buClrTx/>
+              <a:buSzTx/>
+              <a:buFontTx/>
+              <a:buNone/>
+              <a:tabLst/>
+            </a:pPr>
+            <a:r>
+              <a:rPr kumimoji="0" lang="en-US" altLang="en-US" sz="1000" b="0" i="0" u="none" strike="noStrike" cap="none" normalizeH="0" baseline="0" dirty="0">
+                <a:ln>
+                  <a:noFill/>
+                </a:ln>
+                <a:solidFill>
+                  <a:schemeClr val="tx1"/>
+                </a:solidFill>
+                <a:effectLst/>
+                <a:latin typeface="Inter"/>
+              </a:rPr>
+              <a:t> </a:t>
+            </a:r>
+            <a:endParaRPr kumimoji="0" lang="en-US" altLang="en-US" sz="1800" b="0" i="0" u="none" strike="noStrike" cap="none" normalizeH="0" baseline="0" dirty="0">
+              <a:ln>
+                <a:noFill/>
+              </a:ln>
+              <a:solidFill>
+                <a:schemeClr val="tx1"/>
+              </a:solidFill>
+              <a:effectLst/>
+              <a:latin typeface="Arial" panose="020B0604020202020204" pitchFamily="34" charset="0"/>
+            </a:endParaRPr>
+          </a:p>
+        </p:txBody>
+      </p:sp>
+      <p:sp>
+        <p:nvSpPr>
+          <p:cNvPr id="2" name="Date Placeholder 1">
+            <a:extLst>
+              <a:ext uri="{FF2B5EF4-FFF2-40B4-BE49-F238E27FC236}">
+                <a16:creationId xmlns:a16="http://schemas.microsoft.com/office/drawing/2014/main" id="{7AEE3541-B78E-4C7D-8389-64C49352DDDC}"/>
+              </a:ext>
+            </a:extLst>
+          </p:cNvPr>
+          <p:cNvSpPr>
+            <a:spLocks noGrp="1"/>
+          </p:cNvSpPr>
+          <p:nvPr>
+            <p:ph type="dt" sz="half" idx="10"/>
+          </p:nvPr>
+        </p:nvSpPr>
+        <p:spPr/>
+        <p:txBody>
+          <a:bodyPr/>
+          <a:lstStyle/>
+          <a:p>
+            <a:r>
+              <a:rPr lang="en-US"/>
+              <a:t>6/9/2021</a:t>
+            </a:r>
+          </a:p>
+        </p:txBody>
+      </p:sp>
+      <p:sp>
+        <p:nvSpPr>
+          <p:cNvPr id="5" name="Slide Number Placeholder 4">
+            <a:extLst>
+              <a:ext uri="{FF2B5EF4-FFF2-40B4-BE49-F238E27FC236}">
+                <a16:creationId xmlns:a16="http://schemas.microsoft.com/office/drawing/2014/main" id="{2571ECD3-A964-4F1E-91F4-108AD9767ED5}"/>
+              </a:ext>
+            </a:extLst>
+          </p:cNvPr>
+          <p:cNvSpPr>
+            <a:spLocks noGrp="1"/>
+          </p:cNvSpPr>
+          <p:nvPr>
+            <p:ph type="sldNum" sz="quarter" idx="12"/>
+          </p:nvPr>
+        </p:nvSpPr>
+        <p:spPr/>
+        <p:txBody>
+          <a:bodyPr/>
+          <a:lstStyle/>
+          <a:p>
+            <a:fld id="{3AA9003C-6A8E-4863-AB7A-EC3E1B799067}" type="slidenum">
+              <a:rPr lang="en-US" smtClean="0"/>
+              <a:t>10</a:t>
+            </a:fld>
+            <a:endParaRPr lang="en-US"/>
+          </a:p>
+        </p:txBody>
+      </p:sp>
+      <p:pic>
+        <p:nvPicPr>
+          <p:cNvPr id="10" name="Picture 9">
+            <a:extLst>
+              <a:ext uri="{FF2B5EF4-FFF2-40B4-BE49-F238E27FC236}">
+                <a16:creationId xmlns:a16="http://schemas.microsoft.com/office/drawing/2014/main" id="{E9C5EDD0-334D-4D25-9296-55CE4B249C7F}"/>
+              </a:ext>
+            </a:extLst>
+          </p:cNvPr>
+          <p:cNvPicPr>
+            <a:picLocks noChangeAspect="1"/>
+          </p:cNvPicPr>
+          <p:nvPr/>
+        </p:nvPicPr>
+        <p:blipFill>
+          <a:blip r:embed="rId3"/>
+          <a:stretch>
+            <a:fillRect/>
+          </a:stretch>
+        </p:blipFill>
+        <p:spPr>
+          <a:xfrm>
+            <a:off x="3524249" y="1976797"/>
+            <a:ext cx="4819650" cy="1301750"/>
+          </a:xfrm>
+          <a:prstGeom prst="rect">
+            <a:avLst/>
+          </a:prstGeom>
+        </p:spPr>
+      </p:pic>
+      <p:sp>
+        <p:nvSpPr>
+          <p:cNvPr id="11" name="Rectangle 10">
+            <a:extLst>
+              <a:ext uri="{FF2B5EF4-FFF2-40B4-BE49-F238E27FC236}">
+                <a16:creationId xmlns:a16="http://schemas.microsoft.com/office/drawing/2014/main" id="{4E511B32-E1C5-4DE2-8EE7-2C03D51262AF}"/>
+              </a:ext>
+            </a:extLst>
+          </p:cNvPr>
+          <p:cNvSpPr/>
+          <p:nvPr/>
+        </p:nvSpPr>
+        <p:spPr>
+          <a:xfrm>
+            <a:off x="1175718" y="2162008"/>
+            <a:ext cx="9840562" cy="1754326"/>
+          </a:xfrm>
+          <a:prstGeom prst="rect">
+            <a:avLst/>
+          </a:prstGeom>
+          <a:noFill/>
+        </p:spPr>
+        <p:txBody>
+          <a:bodyPr wrap="square" lIns="91440" tIns="45720" rIns="91440" bIns="45720">
+            <a:spAutoFit/>
+          </a:bodyPr>
+          <a:lstStyle/>
+          <a:p>
+            <a:pPr algn="ctr"/>
+            <a:r>
+              <a:rPr lang="en-US" sz="5400" dirty="0"/>
+              <a:t>Draft – will add a bar chart  of reported cases 1/22/20</a:t>
+            </a:r>
+            <a:endParaRPr lang="en-US" sz="5400" b="0" cap="none" spc="0" dirty="0">
+              <a:ln w="0"/>
+              <a:solidFill>
+                <a:schemeClr val="tx1"/>
+              </a:solidFill>
+              <a:effectLst>
+                <a:outerShdw blurRad="38100" dist="19050" dir="2700000" algn="tl" rotWithShape="0">
+                  <a:schemeClr val="dk1">
+                    <a:alpha val="40000"/>
+                  </a:schemeClr>
+                </a:outerShdw>
+              </a:effectLst>
+            </a:endParaRPr>
+          </a:p>
+        </p:txBody>
+      </p:sp>
+    </p:spTree>
+    <p:extLst>
+      <p:ext uri="{BB962C8B-B14F-4D97-AF65-F5344CB8AC3E}">
+        <p14:creationId xmlns:p14="http://schemas.microsoft.com/office/powerpoint/2010/main" val="2416682117"/>
+      </p:ext>
+    </p:extLst>
+  </p:cSld>
+  <p:clrMapOvr>
+    <a:masterClrMapping/>
+  </p:clrMapOvr>
+</p:sld>
+</file>
+
+<file path=ppt/slides/slide11.xml><?xml version="1.0" encoding="utf-8"?>
+<p:sld xmlns:a="http://schemas.openxmlformats.org/drawingml/2006/main" xmlns:r="http://schemas.openxmlformats.org/officeDocument/2006/relationships" xmlns:p="http://schemas.openxmlformats.org/presentationml/2006/main">
+  <p:cSld>
+    <p:spTree>
+      <p:nvGrpSpPr>
+        <p:cNvPr id="1" name=""/>
+        <p:cNvGrpSpPr/>
+        <p:nvPr/>
+      </p:nvGrpSpPr>
+      <p:grpSpPr>
+        <a:xfrm>
+          <a:off x="0" y="0"/>
+          <a:ext cx="0" cy="0"/>
+          <a:chOff x="0" y="0"/>
+          <a:chExt cx="0" cy="0"/>
+        </a:xfrm>
+      </p:grpSpPr>
+      <p:sp>
+        <p:nvSpPr>
+          <p:cNvPr id="4" name="Title 3">
+            <a:extLst>
+              <a:ext uri="{FF2B5EF4-FFF2-40B4-BE49-F238E27FC236}">
+                <a16:creationId xmlns:a16="http://schemas.microsoft.com/office/drawing/2014/main" id="{8DB41184-8C94-46D3-9D80-4AC9E806E8D5}"/>
+              </a:ext>
+            </a:extLst>
+          </p:cNvPr>
+          <p:cNvSpPr>
+            <a:spLocks noGrp="1"/>
+          </p:cNvSpPr>
+          <p:nvPr>
+            <p:ph type="title"/>
+          </p:nvPr>
+        </p:nvSpPr>
+        <p:spPr>
+          <a:xfrm>
+            <a:off x="838200" y="212726"/>
+            <a:ext cx="10515600" cy="1111250"/>
+          </a:xfrm>
+        </p:spPr>
+        <p:txBody>
+          <a:bodyPr>
+            <a:normAutofit/>
+          </a:bodyPr>
+          <a:lstStyle/>
+          <a:p>
+            <a:pPr algn="ctr"/>
+            <a:r>
+              <a:rPr lang="en-US" sz="4400" dirty="0"/>
+              <a:t>Covid-19 Cumulative Global </a:t>
+            </a:r>
+            <a:r>
+              <a:rPr lang="en-US" dirty="0"/>
+              <a:t>Cases</a:t>
+            </a:r>
+          </a:p>
+        </p:txBody>
+      </p:sp>
+      <p:sp>
+        <p:nvSpPr>
+          <p:cNvPr id="7" name="Footer Placeholder 6">
+            <a:extLst>
+              <a:ext uri="{FF2B5EF4-FFF2-40B4-BE49-F238E27FC236}">
+                <a16:creationId xmlns:a16="http://schemas.microsoft.com/office/drawing/2014/main" id="{840787EF-019F-4D4A-9C20-A253BA226D98}"/>
+              </a:ext>
+            </a:extLst>
+          </p:cNvPr>
+          <p:cNvSpPr>
+            <a:spLocks noGrp="1"/>
+          </p:cNvSpPr>
+          <p:nvPr>
+            <p:ph type="ftr" sz="quarter" idx="11"/>
+          </p:nvPr>
+        </p:nvSpPr>
+        <p:spPr/>
+        <p:txBody>
+          <a:bodyPr/>
+          <a:lstStyle/>
+          <a:p>
+            <a:pPr marL="0" marR="0" lvl="0" indent="0" algn="ctr" defTabSz="914400" rtl="0" eaLnBrk="1" fontAlgn="auto" latinLnBrk="0" hangingPunct="1">
+              <a:lnSpc>
+                <a:spcPct val="100000"/>
+              </a:lnSpc>
+              <a:spcBef>
+                <a:spcPts val="0"/>
+              </a:spcBef>
+              <a:spcAft>
+                <a:spcPts val="0"/>
+              </a:spcAft>
+              <a:buClrTx/>
+              <a:buSzTx/>
+              <a:buFontTx/>
+              <a:buNone/>
+              <a:tabLst/>
+              <a:defRPr/>
+            </a:pPr>
+            <a:r>
+              <a:rPr kumimoji="0" lang="en-US" sz="1200" b="0" i="0" u="none" strike="noStrike" kern="1200" cap="none" spc="0" normalizeH="0" baseline="0" noProof="0">
+                <a:ln>
+                  <a:noFill/>
+                </a:ln>
+                <a:solidFill>
+                  <a:prstClr val="black">
+                    <a:tint val="75000"/>
+                  </a:prstClr>
+                </a:solidFill>
+                <a:effectLst/>
+                <a:uLnTx/>
+                <a:uFillTx/>
+                <a:latin typeface="Calibri" panose="020F0502020204030204"/>
+                <a:ea typeface="+mn-ea"/>
+                <a:cs typeface="+mn-cs"/>
+              </a:rPr>
+              <a:t>https://github.com/makbarish/Grp5_Project1_Covid19</a:t>
+            </a:r>
+          </a:p>
+        </p:txBody>
+      </p:sp>
+      <p:sp>
+        <p:nvSpPr>
+          <p:cNvPr id="2" name="Date Placeholder 1">
+            <a:extLst>
+              <a:ext uri="{FF2B5EF4-FFF2-40B4-BE49-F238E27FC236}">
+                <a16:creationId xmlns:a16="http://schemas.microsoft.com/office/drawing/2014/main" id="{A346B64B-8A1C-43A1-84CB-2D58DBBC7959}"/>
+              </a:ext>
+            </a:extLst>
+          </p:cNvPr>
+          <p:cNvSpPr>
+            <a:spLocks noGrp="1"/>
+          </p:cNvSpPr>
+          <p:nvPr>
+            <p:ph type="dt" sz="half" idx="10"/>
+          </p:nvPr>
+        </p:nvSpPr>
+        <p:spPr/>
+        <p:txBody>
+          <a:bodyPr/>
+          <a:lstStyle/>
+          <a:p>
+            <a:pPr marL="0" marR="0" lvl="0" indent="0" algn="l" defTabSz="914400" rtl="0" eaLnBrk="1" fontAlgn="auto" latinLnBrk="0" hangingPunct="1">
+              <a:lnSpc>
+                <a:spcPct val="100000"/>
+              </a:lnSpc>
+              <a:spcBef>
+                <a:spcPts val="0"/>
+              </a:spcBef>
+              <a:spcAft>
+                <a:spcPts val="0"/>
+              </a:spcAft>
+              <a:buClrTx/>
+              <a:buSzTx/>
+              <a:buFontTx/>
+              <a:buNone/>
+              <a:tabLst/>
+              <a:defRPr/>
+            </a:pPr>
+            <a:r>
+              <a:rPr kumimoji="0" lang="en-US" sz="1200" b="0" i="0" u="none" strike="noStrike" kern="1200" cap="none" spc="0" normalizeH="0" baseline="0" noProof="0">
+                <a:ln>
+                  <a:noFill/>
+                </a:ln>
+                <a:solidFill>
+                  <a:prstClr val="black">
+                    <a:tint val="75000"/>
+                  </a:prstClr>
+                </a:solidFill>
+                <a:effectLst/>
+                <a:uLnTx/>
+                <a:uFillTx/>
+                <a:latin typeface="Calibri" panose="020F0502020204030204"/>
+                <a:ea typeface="+mn-ea"/>
+                <a:cs typeface="+mn-cs"/>
+              </a:rPr>
+              <a:t>6/9/2021</a:t>
+            </a:r>
+          </a:p>
+        </p:txBody>
+      </p:sp>
+      <p:sp>
+        <p:nvSpPr>
+          <p:cNvPr id="3" name="Slide Number Placeholder 2">
+            <a:extLst>
+              <a:ext uri="{FF2B5EF4-FFF2-40B4-BE49-F238E27FC236}">
+                <a16:creationId xmlns:a16="http://schemas.microsoft.com/office/drawing/2014/main" id="{0AB42B2B-D6AE-4A28-9832-61266DCC28CC}"/>
+              </a:ext>
+            </a:extLst>
+          </p:cNvPr>
+          <p:cNvSpPr>
+            <a:spLocks noGrp="1"/>
+          </p:cNvSpPr>
+          <p:nvPr>
+            <p:ph type="sldNum" sz="quarter" idx="12"/>
+          </p:nvPr>
+        </p:nvSpPr>
+        <p:spPr/>
+        <p:txBody>
+          <a:bodyPr/>
+          <a:lstStyle/>
+          <a:p>
+            <a:pPr marL="0" marR="0" lvl="0" indent="0" algn="r" defTabSz="914400" rtl="0" eaLnBrk="1" fontAlgn="auto" latinLnBrk="0" hangingPunct="1">
+              <a:lnSpc>
+                <a:spcPct val="100000"/>
+              </a:lnSpc>
+              <a:spcBef>
+                <a:spcPts val="0"/>
+              </a:spcBef>
+              <a:spcAft>
+                <a:spcPts val="0"/>
+              </a:spcAft>
+              <a:buClrTx/>
+              <a:buSzTx/>
+              <a:buFontTx/>
+              <a:buNone/>
+              <a:tabLst/>
+              <a:defRPr/>
+            </a:pPr>
+            <a:fld id="{3AA9003C-6A8E-4863-AB7A-EC3E1B799067}" type="slidenum">
+              <a:rPr kumimoji="0" lang="en-US" sz="1200" b="0" i="0" u="none" strike="noStrike" kern="1200" cap="none" spc="0" normalizeH="0" baseline="0" noProof="0" smtClean="0">
+                <a:ln>
+                  <a:noFill/>
+                </a:ln>
+                <a:solidFill>
+                  <a:prstClr val="black">
+                    <a:tint val="75000"/>
+                  </a:prstClr>
+                </a:solidFill>
+                <a:effectLst/>
+                <a:uLnTx/>
+                <a:uFillTx/>
+                <a:latin typeface="Calibri" panose="020F0502020204030204"/>
+                <a:ea typeface="+mn-ea"/>
+                <a:cs typeface="+mn-cs"/>
+              </a:rPr>
+              <a:pPr marL="0" marR="0" lvl="0" indent="0" algn="r" defTabSz="914400" rtl="0" eaLnBrk="1" fontAlgn="auto" latinLnBrk="0" hangingPunct="1">
+                <a:lnSpc>
+                  <a:spcPct val="100000"/>
+                </a:lnSpc>
+                <a:spcBef>
+                  <a:spcPts val="0"/>
+                </a:spcBef>
+                <a:spcAft>
+                  <a:spcPts val="0"/>
+                </a:spcAft>
+                <a:buClrTx/>
+                <a:buSzTx/>
+                <a:buFontTx/>
+                <a:buNone/>
+                <a:tabLst/>
+                <a:defRPr/>
+              </a:pPr>
+              <a:t>11</a:t>
+            </a:fld>
+            <a:endParaRPr kumimoji="0" lang="en-US" sz="1200" b="0" i="0" u="none" strike="noStrike" kern="1200" cap="none" spc="0" normalizeH="0" baseline="0" noProof="0">
+              <a:ln>
+                <a:noFill/>
+              </a:ln>
+              <a:solidFill>
+                <a:prstClr val="black">
+                  <a:tint val="75000"/>
+                </a:prstClr>
+              </a:solidFill>
+              <a:effectLst/>
+              <a:uLnTx/>
+              <a:uFillTx/>
+              <a:latin typeface="Calibri" panose="020F0502020204030204"/>
+              <a:ea typeface="+mn-ea"/>
+              <a:cs typeface="+mn-cs"/>
+            </a:endParaRPr>
+          </a:p>
+        </p:txBody>
+      </p:sp>
+      <p:sp>
+        <p:nvSpPr>
+          <p:cNvPr id="5" name="TextBox 4">
+            <a:extLst>
+              <a:ext uri="{FF2B5EF4-FFF2-40B4-BE49-F238E27FC236}">
+                <a16:creationId xmlns:a16="http://schemas.microsoft.com/office/drawing/2014/main" id="{8035114C-C13B-40D3-A75A-22BFA6C3F723}"/>
+              </a:ext>
+            </a:extLst>
+          </p:cNvPr>
+          <p:cNvSpPr txBox="1"/>
+          <p:nvPr/>
+        </p:nvSpPr>
+        <p:spPr>
+          <a:xfrm>
+            <a:off x="3535681" y="2357306"/>
+            <a:ext cx="5074919" cy="2031325"/>
+          </a:xfrm>
+          <a:prstGeom prst="rect">
+            <a:avLst/>
+          </a:prstGeom>
+          <a:noFill/>
+        </p:spPr>
+        <p:txBody>
+          <a:bodyPr wrap="square" rtlCol="0">
+            <a:spAutoFit/>
+          </a:bodyPr>
+          <a:lstStyle/>
+          <a:p>
+            <a:r>
+              <a:rPr lang="en-US" dirty="0"/>
+              <a:t>Add slides</a:t>
+            </a:r>
+          </a:p>
+          <a:p>
+            <a:r>
+              <a:rPr lang="en-US" dirty="0"/>
+              <a:t>Clay – bar graph of reported cases 1/22/20</a:t>
+            </a:r>
+          </a:p>
+          <a:p>
+            <a:r>
+              <a:rPr lang="en-US" dirty="0"/>
+              <a:t>Revathi – vaccine top 10</a:t>
+            </a:r>
+          </a:p>
+          <a:p>
+            <a:r>
+              <a:rPr lang="en-US" dirty="0"/>
+              <a:t>	vaccine bottom 10</a:t>
+            </a:r>
+          </a:p>
+          <a:p>
+            <a:r>
+              <a:rPr lang="en-US" dirty="0"/>
+              <a:t>	vaccine all by percent/population</a:t>
+            </a:r>
+          </a:p>
+          <a:p>
+            <a:r>
+              <a:rPr lang="en-US" dirty="0"/>
+              <a:t>Julio - %deaths against pop and </a:t>
+            </a:r>
+            <a:r>
+              <a:rPr lang="en-US" dirty="0" err="1"/>
+              <a:t>gdp</a:t>
+            </a:r>
+            <a:endParaRPr lang="en-US" dirty="0"/>
+          </a:p>
+          <a:p>
+            <a:r>
+              <a:rPr lang="en-US" dirty="0"/>
+              <a:t>	map of top 10 (per Revathi)</a:t>
+            </a:r>
+          </a:p>
+        </p:txBody>
+      </p:sp>
+    </p:spTree>
+    <p:extLst>
+      <p:ext uri="{BB962C8B-B14F-4D97-AF65-F5344CB8AC3E}">
+        <p14:creationId xmlns:p14="http://schemas.microsoft.com/office/powerpoint/2010/main" val="1607740863"/>
+      </p:ext>
+    </p:extLst>
+  </p:cSld>
+  <p:clrMapOvr>
+    <a:masterClrMapping/>
+  </p:clrMapOvr>
+</p:sld>
+</file>
+
+<file path=ppt/slides/slide12.xml><?xml version="1.0" encoding="utf-8"?>
+<p:sld xmlns:a="http://schemas.openxmlformats.org/drawingml/2006/main" xmlns:r="http://schemas.openxmlformats.org/officeDocument/2006/relationships" xmlns:p="http://schemas.openxmlformats.org/presentationml/2006/main">
+  <p:cSld>
+    <p:spTree>
+      <p:nvGrpSpPr>
+        <p:cNvPr id="1" name=""/>
+        <p:cNvGrpSpPr/>
+        <p:nvPr/>
+      </p:nvGrpSpPr>
+      <p:grpSpPr>
+        <a:xfrm>
+          <a:off x="0" y="0"/>
+          <a:ext cx="0" cy="0"/>
+          <a:chOff x="0" y="0"/>
+          <a:chExt cx="0" cy="0"/>
+        </a:xfrm>
+      </p:grpSpPr>
+      <p:sp>
+        <p:nvSpPr>
+          <p:cNvPr id="4" name="Title 3">
+            <a:extLst>
+              <a:ext uri="{FF2B5EF4-FFF2-40B4-BE49-F238E27FC236}">
+                <a16:creationId xmlns:a16="http://schemas.microsoft.com/office/drawing/2014/main" id="{8DB41184-8C94-46D3-9D80-4AC9E806E8D5}"/>
+              </a:ext>
+            </a:extLst>
+          </p:cNvPr>
+          <p:cNvSpPr>
+            <a:spLocks noGrp="1"/>
+          </p:cNvSpPr>
+          <p:nvPr>
+            <p:ph type="title"/>
+          </p:nvPr>
+        </p:nvSpPr>
+        <p:spPr>
+          <a:xfrm>
+            <a:off x="838200" y="212726"/>
+            <a:ext cx="10515600" cy="1111250"/>
+          </a:xfrm>
+        </p:spPr>
+        <p:txBody>
+          <a:bodyPr>
+            <a:normAutofit/>
+          </a:bodyPr>
+          <a:lstStyle/>
+          <a:p>
+            <a:pPr algn="ctr"/>
+            <a:r>
+              <a:rPr lang="en-US" sz="4400" dirty="0"/>
+              <a:t>Covid-19 Cumulative Global </a:t>
+            </a:r>
+            <a:r>
+              <a:rPr lang="en-US" dirty="0"/>
+              <a:t>Cases</a:t>
+            </a:r>
+          </a:p>
+        </p:txBody>
+      </p:sp>
+      <p:sp>
+        <p:nvSpPr>
+          <p:cNvPr id="7" name="Footer Placeholder 6">
+            <a:extLst>
+              <a:ext uri="{FF2B5EF4-FFF2-40B4-BE49-F238E27FC236}">
+                <a16:creationId xmlns:a16="http://schemas.microsoft.com/office/drawing/2014/main" id="{840787EF-019F-4D4A-9C20-A253BA226D98}"/>
+              </a:ext>
+            </a:extLst>
+          </p:cNvPr>
+          <p:cNvSpPr>
+            <a:spLocks noGrp="1"/>
+          </p:cNvSpPr>
+          <p:nvPr>
+            <p:ph type="ftr" sz="quarter" idx="11"/>
+          </p:nvPr>
+        </p:nvSpPr>
+        <p:spPr/>
+        <p:txBody>
+          <a:bodyPr/>
+          <a:lstStyle/>
+          <a:p>
+            <a:pPr marL="0" marR="0" lvl="0" indent="0" algn="ctr" defTabSz="914400" rtl="0" eaLnBrk="1" fontAlgn="auto" latinLnBrk="0" hangingPunct="1">
+              <a:lnSpc>
+                <a:spcPct val="100000"/>
+              </a:lnSpc>
+              <a:spcBef>
+                <a:spcPts val="0"/>
+              </a:spcBef>
+              <a:spcAft>
+                <a:spcPts val="0"/>
+              </a:spcAft>
+              <a:buClrTx/>
+              <a:buSzTx/>
+              <a:buFontTx/>
+              <a:buNone/>
+              <a:tabLst/>
+              <a:defRPr/>
+            </a:pPr>
+            <a:r>
+              <a:rPr kumimoji="0" lang="en-US" sz="1200" b="0" i="0" u="none" strike="noStrike" kern="1200" cap="none" spc="0" normalizeH="0" baseline="0" noProof="0">
+                <a:ln>
+                  <a:noFill/>
+                </a:ln>
+                <a:solidFill>
+                  <a:prstClr val="black">
+                    <a:tint val="75000"/>
+                  </a:prstClr>
+                </a:solidFill>
+                <a:effectLst/>
+                <a:uLnTx/>
+                <a:uFillTx/>
+                <a:latin typeface="Calibri" panose="020F0502020204030204"/>
+                <a:ea typeface="+mn-ea"/>
+                <a:cs typeface="+mn-cs"/>
+              </a:rPr>
+              <a:t>https://github.com/makbarish/Grp5_Project1_Covid19</a:t>
+            </a:r>
+          </a:p>
+        </p:txBody>
+      </p:sp>
+      <p:sp>
+        <p:nvSpPr>
+          <p:cNvPr id="2" name="Date Placeholder 1">
+            <a:extLst>
+              <a:ext uri="{FF2B5EF4-FFF2-40B4-BE49-F238E27FC236}">
+                <a16:creationId xmlns:a16="http://schemas.microsoft.com/office/drawing/2014/main" id="{A346B64B-8A1C-43A1-84CB-2D58DBBC7959}"/>
+              </a:ext>
+            </a:extLst>
+          </p:cNvPr>
+          <p:cNvSpPr>
+            <a:spLocks noGrp="1"/>
+          </p:cNvSpPr>
+          <p:nvPr>
+            <p:ph type="dt" sz="half" idx="10"/>
+          </p:nvPr>
+        </p:nvSpPr>
+        <p:spPr/>
+        <p:txBody>
+          <a:bodyPr/>
+          <a:lstStyle/>
+          <a:p>
+            <a:pPr marL="0" marR="0" lvl="0" indent="0" algn="l" defTabSz="914400" rtl="0" eaLnBrk="1" fontAlgn="auto" latinLnBrk="0" hangingPunct="1">
+              <a:lnSpc>
+                <a:spcPct val="100000"/>
+              </a:lnSpc>
+              <a:spcBef>
+                <a:spcPts val="0"/>
+              </a:spcBef>
+              <a:spcAft>
+                <a:spcPts val="0"/>
+              </a:spcAft>
+              <a:buClrTx/>
+              <a:buSzTx/>
+              <a:buFontTx/>
+              <a:buNone/>
+              <a:tabLst/>
+              <a:defRPr/>
+            </a:pPr>
+            <a:r>
+              <a:rPr kumimoji="0" lang="en-US" sz="1200" b="0" i="0" u="none" strike="noStrike" kern="1200" cap="none" spc="0" normalizeH="0" baseline="0" noProof="0">
+                <a:ln>
+                  <a:noFill/>
+                </a:ln>
+                <a:solidFill>
+                  <a:prstClr val="black">
+                    <a:tint val="75000"/>
+                  </a:prstClr>
+                </a:solidFill>
+                <a:effectLst/>
+                <a:uLnTx/>
+                <a:uFillTx/>
+                <a:latin typeface="Calibri" panose="020F0502020204030204"/>
+                <a:ea typeface="+mn-ea"/>
+                <a:cs typeface="+mn-cs"/>
+              </a:rPr>
+              <a:t>6/9/2021</a:t>
+            </a:r>
+          </a:p>
+        </p:txBody>
+      </p:sp>
+      <p:sp>
+        <p:nvSpPr>
+          <p:cNvPr id="3" name="Slide Number Placeholder 2">
+            <a:extLst>
+              <a:ext uri="{FF2B5EF4-FFF2-40B4-BE49-F238E27FC236}">
+                <a16:creationId xmlns:a16="http://schemas.microsoft.com/office/drawing/2014/main" id="{0AB42B2B-D6AE-4A28-9832-61266DCC28CC}"/>
+              </a:ext>
+            </a:extLst>
+          </p:cNvPr>
+          <p:cNvSpPr>
+            <a:spLocks noGrp="1"/>
+          </p:cNvSpPr>
+          <p:nvPr>
+            <p:ph type="sldNum" sz="quarter" idx="12"/>
+          </p:nvPr>
+        </p:nvSpPr>
+        <p:spPr/>
+        <p:txBody>
+          <a:bodyPr/>
+          <a:lstStyle/>
+          <a:p>
+            <a:pPr marL="0" marR="0" lvl="0" indent="0" algn="r" defTabSz="914400" rtl="0" eaLnBrk="1" fontAlgn="auto" latinLnBrk="0" hangingPunct="1">
+              <a:lnSpc>
+                <a:spcPct val="100000"/>
+              </a:lnSpc>
+              <a:spcBef>
+                <a:spcPts val="0"/>
+              </a:spcBef>
+              <a:spcAft>
+                <a:spcPts val="0"/>
+              </a:spcAft>
+              <a:buClrTx/>
+              <a:buSzTx/>
+              <a:buFontTx/>
+              <a:buNone/>
+              <a:tabLst/>
+              <a:defRPr/>
+            </a:pPr>
+            <a:fld id="{3AA9003C-6A8E-4863-AB7A-EC3E1B799067}" type="slidenum">
+              <a:rPr kumimoji="0" lang="en-US" sz="1200" b="0" i="0" u="none" strike="noStrike" kern="1200" cap="none" spc="0" normalizeH="0" baseline="0" noProof="0" smtClean="0">
+                <a:ln>
+                  <a:noFill/>
+                </a:ln>
+                <a:solidFill>
+                  <a:prstClr val="black">
+                    <a:tint val="75000"/>
+                  </a:prstClr>
+                </a:solidFill>
+                <a:effectLst/>
+                <a:uLnTx/>
+                <a:uFillTx/>
+                <a:latin typeface="Calibri" panose="020F0502020204030204"/>
+                <a:ea typeface="+mn-ea"/>
+                <a:cs typeface="+mn-cs"/>
+              </a:rPr>
+              <a:pPr marL="0" marR="0" lvl="0" indent="0" algn="r" defTabSz="914400" rtl="0" eaLnBrk="1" fontAlgn="auto" latinLnBrk="0" hangingPunct="1">
+                <a:lnSpc>
+                  <a:spcPct val="100000"/>
+                </a:lnSpc>
+                <a:spcBef>
+                  <a:spcPts val="0"/>
+                </a:spcBef>
+                <a:spcAft>
+                  <a:spcPts val="0"/>
+                </a:spcAft>
+                <a:buClrTx/>
+                <a:buSzTx/>
+                <a:buFontTx/>
+                <a:buNone/>
+                <a:tabLst/>
+                <a:defRPr/>
+              </a:pPr>
+              <a:t>12</a:t>
+            </a:fld>
+            <a:endParaRPr kumimoji="0" lang="en-US" sz="1200" b="0" i="0" u="none" strike="noStrike" kern="1200" cap="none" spc="0" normalizeH="0" baseline="0" noProof="0">
+              <a:ln>
+                <a:noFill/>
+              </a:ln>
+              <a:solidFill>
+                <a:prstClr val="black">
+                  <a:tint val="75000"/>
+                </a:prstClr>
+              </a:solidFill>
+              <a:effectLst/>
+              <a:uLnTx/>
+              <a:uFillTx/>
+              <a:latin typeface="Calibri" panose="020F0502020204030204"/>
+              <a:ea typeface="+mn-ea"/>
+              <a:cs typeface="+mn-cs"/>
+            </a:endParaRPr>
+          </a:p>
+        </p:txBody>
+      </p:sp>
+      <p:pic>
+        <p:nvPicPr>
+          <p:cNvPr id="10" name="Picture 9" descr="Chart, line chart&#10;&#10;Description automatically generated">
+            <a:extLst>
+              <a:ext uri="{FF2B5EF4-FFF2-40B4-BE49-F238E27FC236}">
+                <a16:creationId xmlns:a16="http://schemas.microsoft.com/office/drawing/2014/main" id="{482F9284-34FB-444B-8DD6-17AFD0691EC7}"/>
+              </a:ext>
+            </a:extLst>
+          </p:cNvPr>
+          <p:cNvPicPr>
+            <a:picLocks noChangeAspect="1"/>
+          </p:cNvPicPr>
+          <p:nvPr/>
+        </p:nvPicPr>
+        <p:blipFill>
+          <a:blip r:embed="rId2">
+            <a:extLst>
+              <a:ext uri="{28A0092B-C50C-407E-A947-70E740481C1C}">
+                <a14:useLocalDpi xmlns:a14="http://schemas.microsoft.com/office/drawing/2010/main" val="0"/>
+              </a:ext>
+            </a:extLst>
+          </a:blip>
+          <a:stretch>
+            <a:fillRect/>
+          </a:stretch>
+        </p:blipFill>
+        <p:spPr>
+          <a:xfrm>
+            <a:off x="1358365" y="1436057"/>
+            <a:ext cx="9142857" cy="4571428"/>
+          </a:xfrm>
+          <a:prstGeom prst="rect">
+            <a:avLst/>
+          </a:prstGeom>
+        </p:spPr>
+      </p:pic>
+    </p:spTree>
+    <p:extLst>
+      <p:ext uri="{BB962C8B-B14F-4D97-AF65-F5344CB8AC3E}">
+        <p14:creationId xmlns:p14="http://schemas.microsoft.com/office/powerpoint/2010/main" val="1470202090"/>
+      </p:ext>
+    </p:extLst>
+  </p:cSld>
+  <p:clrMapOvr>
+    <a:masterClrMapping/>
+  </p:clrMapOvr>
+</p:sld>
+</file>
+
+<file path=ppt/slides/slide13.xml><?xml version="1.0" encoding="utf-8"?>
+<p:sld xmlns:a="http://schemas.openxmlformats.org/drawingml/2006/main" xmlns:r="http://schemas.openxmlformats.org/officeDocument/2006/relationships" xmlns:p="http://schemas.openxmlformats.org/presentationml/2006/main">
+  <p:cSld>
+    <p:spTree>
+      <p:nvGrpSpPr>
+        <p:cNvPr id="1" name=""/>
+        <p:cNvGrpSpPr/>
+        <p:nvPr/>
+      </p:nvGrpSpPr>
+      <p:grpSpPr>
+        <a:xfrm>
+          <a:off x="0" y="0"/>
+          <a:ext cx="0" cy="0"/>
+          <a:chOff x="0" y="0"/>
+          <a:chExt cx="0" cy="0"/>
+        </a:xfrm>
+      </p:grpSpPr>
+      <p:sp>
+        <p:nvSpPr>
+          <p:cNvPr id="4" name="Title 3">
+            <a:extLst>
+              <a:ext uri="{FF2B5EF4-FFF2-40B4-BE49-F238E27FC236}">
+                <a16:creationId xmlns:a16="http://schemas.microsoft.com/office/drawing/2014/main" id="{8DB41184-8C94-46D3-9D80-4AC9E806E8D5}"/>
+              </a:ext>
+            </a:extLst>
+          </p:cNvPr>
+          <p:cNvSpPr>
+            <a:spLocks noGrp="1"/>
+          </p:cNvSpPr>
+          <p:nvPr>
+            <p:ph type="title"/>
+          </p:nvPr>
+        </p:nvSpPr>
+        <p:spPr>
+          <a:xfrm>
+            <a:off x="838200" y="212726"/>
+            <a:ext cx="10515600" cy="1111250"/>
+          </a:xfrm>
+        </p:spPr>
+        <p:txBody>
+          <a:bodyPr>
+            <a:normAutofit fontScale="90000"/>
+          </a:bodyPr>
+          <a:lstStyle/>
+          <a:p>
+            <a:pPr algn="ctr"/>
+            <a:r>
+              <a:rPr lang="en-US" sz="4400" dirty="0"/>
+              <a:t>Covid-19 Fully Vaccinated </a:t>
+            </a:r>
+            <a:br>
+              <a:rPr lang="en-US" sz="4400" dirty="0"/>
+            </a:br>
+            <a:r>
+              <a:rPr lang="en-US" sz="3100" dirty="0"/>
+              <a:t>(Top Ten Countries)</a:t>
+            </a:r>
+          </a:p>
+        </p:txBody>
+      </p:sp>
+      <p:sp>
+        <p:nvSpPr>
+          <p:cNvPr id="7" name="Footer Placeholder 6">
+            <a:extLst>
+              <a:ext uri="{FF2B5EF4-FFF2-40B4-BE49-F238E27FC236}">
+                <a16:creationId xmlns:a16="http://schemas.microsoft.com/office/drawing/2014/main" id="{840787EF-019F-4D4A-9C20-A253BA226D98}"/>
+              </a:ext>
+            </a:extLst>
+          </p:cNvPr>
+          <p:cNvSpPr>
+            <a:spLocks noGrp="1"/>
+          </p:cNvSpPr>
+          <p:nvPr>
+            <p:ph type="ftr" sz="quarter" idx="11"/>
+          </p:nvPr>
+        </p:nvSpPr>
+        <p:spPr/>
+        <p:txBody>
+          <a:bodyPr/>
+          <a:lstStyle/>
+          <a:p>
+            <a:pPr marL="0" marR="0" lvl="0" indent="0" algn="ctr" defTabSz="914400" rtl="0" eaLnBrk="1" fontAlgn="auto" latinLnBrk="0" hangingPunct="1">
+              <a:lnSpc>
+                <a:spcPct val="100000"/>
+              </a:lnSpc>
+              <a:spcBef>
+                <a:spcPts val="0"/>
+              </a:spcBef>
+              <a:spcAft>
+                <a:spcPts val="0"/>
+              </a:spcAft>
+              <a:buClrTx/>
+              <a:buSzTx/>
+              <a:buFontTx/>
+              <a:buNone/>
+              <a:tabLst/>
+              <a:defRPr/>
+            </a:pPr>
+            <a:r>
+              <a:rPr kumimoji="0" lang="en-US" sz="1200" b="0" i="0" u="none" strike="noStrike" kern="1200" cap="none" spc="0" normalizeH="0" baseline="0" noProof="0">
+                <a:ln>
+                  <a:noFill/>
+                </a:ln>
+                <a:solidFill>
+                  <a:prstClr val="black">
+                    <a:tint val="75000"/>
+                  </a:prstClr>
+                </a:solidFill>
+                <a:effectLst/>
+                <a:uLnTx/>
+                <a:uFillTx/>
+                <a:latin typeface="Calibri" panose="020F0502020204030204"/>
+                <a:ea typeface="+mn-ea"/>
+                <a:cs typeface="+mn-cs"/>
+              </a:rPr>
+              <a:t>https://github.com/makbarish/Grp5_Project1_Covid19</a:t>
+            </a:r>
+          </a:p>
+        </p:txBody>
+      </p:sp>
+      <p:sp>
+        <p:nvSpPr>
+          <p:cNvPr id="2" name="Date Placeholder 1">
+            <a:extLst>
+              <a:ext uri="{FF2B5EF4-FFF2-40B4-BE49-F238E27FC236}">
+                <a16:creationId xmlns:a16="http://schemas.microsoft.com/office/drawing/2014/main" id="{A346B64B-8A1C-43A1-84CB-2D58DBBC7959}"/>
+              </a:ext>
+            </a:extLst>
+          </p:cNvPr>
+          <p:cNvSpPr>
+            <a:spLocks noGrp="1"/>
+          </p:cNvSpPr>
+          <p:nvPr>
+            <p:ph type="dt" sz="half" idx="10"/>
+          </p:nvPr>
+        </p:nvSpPr>
+        <p:spPr/>
+        <p:txBody>
+          <a:bodyPr/>
+          <a:lstStyle/>
+          <a:p>
+            <a:pPr marL="0" marR="0" lvl="0" indent="0" algn="l" defTabSz="914400" rtl="0" eaLnBrk="1" fontAlgn="auto" latinLnBrk="0" hangingPunct="1">
+              <a:lnSpc>
+                <a:spcPct val="100000"/>
+              </a:lnSpc>
+              <a:spcBef>
+                <a:spcPts val="0"/>
+              </a:spcBef>
+              <a:spcAft>
+                <a:spcPts val="0"/>
+              </a:spcAft>
+              <a:buClrTx/>
+              <a:buSzTx/>
+              <a:buFontTx/>
+              <a:buNone/>
+              <a:tabLst/>
+              <a:defRPr/>
+            </a:pPr>
+            <a:r>
+              <a:rPr kumimoji="0" lang="en-US" sz="1200" b="0" i="0" u="none" strike="noStrike" kern="1200" cap="none" spc="0" normalizeH="0" baseline="0" noProof="0">
+                <a:ln>
+                  <a:noFill/>
+                </a:ln>
+                <a:solidFill>
+                  <a:prstClr val="black">
+                    <a:tint val="75000"/>
+                  </a:prstClr>
+                </a:solidFill>
+                <a:effectLst/>
+                <a:uLnTx/>
+                <a:uFillTx/>
+                <a:latin typeface="Calibri" panose="020F0502020204030204"/>
+                <a:ea typeface="+mn-ea"/>
+                <a:cs typeface="+mn-cs"/>
+              </a:rPr>
+              <a:t>6/9/2021</a:t>
+            </a:r>
+          </a:p>
+        </p:txBody>
+      </p:sp>
+      <p:sp>
+        <p:nvSpPr>
+          <p:cNvPr id="3" name="Slide Number Placeholder 2">
+            <a:extLst>
+              <a:ext uri="{FF2B5EF4-FFF2-40B4-BE49-F238E27FC236}">
+                <a16:creationId xmlns:a16="http://schemas.microsoft.com/office/drawing/2014/main" id="{0AB42B2B-D6AE-4A28-9832-61266DCC28CC}"/>
+              </a:ext>
+            </a:extLst>
+          </p:cNvPr>
+          <p:cNvSpPr>
+            <a:spLocks noGrp="1"/>
+          </p:cNvSpPr>
+          <p:nvPr>
+            <p:ph type="sldNum" sz="quarter" idx="12"/>
+          </p:nvPr>
+        </p:nvSpPr>
+        <p:spPr/>
+        <p:txBody>
+          <a:bodyPr/>
+          <a:lstStyle/>
+          <a:p>
+            <a:pPr marL="0" marR="0" lvl="0" indent="0" algn="r" defTabSz="914400" rtl="0" eaLnBrk="1" fontAlgn="auto" latinLnBrk="0" hangingPunct="1">
+              <a:lnSpc>
+                <a:spcPct val="100000"/>
+              </a:lnSpc>
+              <a:spcBef>
+                <a:spcPts val="0"/>
+              </a:spcBef>
+              <a:spcAft>
+                <a:spcPts val="0"/>
+              </a:spcAft>
+              <a:buClrTx/>
+              <a:buSzTx/>
+              <a:buFontTx/>
+              <a:buNone/>
+              <a:tabLst/>
+              <a:defRPr/>
+            </a:pPr>
+            <a:fld id="{3AA9003C-6A8E-4863-AB7A-EC3E1B799067}" type="slidenum">
+              <a:rPr kumimoji="0" lang="en-US" sz="1200" b="0" i="0" u="none" strike="noStrike" kern="1200" cap="none" spc="0" normalizeH="0" baseline="0" noProof="0" smtClean="0">
+                <a:ln>
+                  <a:noFill/>
+                </a:ln>
+                <a:solidFill>
+                  <a:prstClr val="black">
+                    <a:tint val="75000"/>
+                  </a:prstClr>
+                </a:solidFill>
+                <a:effectLst/>
+                <a:uLnTx/>
+                <a:uFillTx/>
+                <a:latin typeface="Calibri" panose="020F0502020204030204"/>
+                <a:ea typeface="+mn-ea"/>
+                <a:cs typeface="+mn-cs"/>
+              </a:rPr>
+              <a:pPr marL="0" marR="0" lvl="0" indent="0" algn="r" defTabSz="914400" rtl="0" eaLnBrk="1" fontAlgn="auto" latinLnBrk="0" hangingPunct="1">
+                <a:lnSpc>
+                  <a:spcPct val="100000"/>
+                </a:lnSpc>
+                <a:spcBef>
+                  <a:spcPts val="0"/>
+                </a:spcBef>
+                <a:spcAft>
+                  <a:spcPts val="0"/>
+                </a:spcAft>
+                <a:buClrTx/>
+                <a:buSzTx/>
+                <a:buFontTx/>
+                <a:buNone/>
+                <a:tabLst/>
+                <a:defRPr/>
+              </a:pPr>
+              <a:t>13</a:t>
+            </a:fld>
+            <a:endParaRPr kumimoji="0" lang="en-US" sz="1200" b="0" i="0" u="none" strike="noStrike" kern="1200" cap="none" spc="0" normalizeH="0" baseline="0" noProof="0">
+              <a:ln>
+                <a:noFill/>
+              </a:ln>
+              <a:solidFill>
+                <a:prstClr val="black">
+                  <a:tint val="75000"/>
+                </a:prstClr>
+              </a:solidFill>
+              <a:effectLst/>
+              <a:uLnTx/>
+              <a:uFillTx/>
+              <a:latin typeface="Calibri" panose="020F0502020204030204"/>
+              <a:ea typeface="+mn-ea"/>
+              <a:cs typeface="+mn-cs"/>
+            </a:endParaRPr>
+          </a:p>
+        </p:txBody>
+      </p:sp>
+      <p:pic>
+        <p:nvPicPr>
+          <p:cNvPr id="10" name="Picture 9">
+            <a:extLst>
+              <a:ext uri="{FF2B5EF4-FFF2-40B4-BE49-F238E27FC236}">
+                <a16:creationId xmlns:a16="http://schemas.microsoft.com/office/drawing/2014/main" id="{B855D865-6236-44F9-AFAA-66A281AD22A3}"/>
+              </a:ext>
+            </a:extLst>
+          </p:cNvPr>
+          <p:cNvPicPr>
+            <a:picLocks noChangeAspect="1"/>
+          </p:cNvPicPr>
+          <p:nvPr/>
+        </p:nvPicPr>
+        <p:blipFill>
+          <a:blip r:embed="rId2">
+            <a:extLst>
+              <a:ext uri="{28A0092B-C50C-407E-A947-70E740481C1C}">
+                <a14:useLocalDpi xmlns:a14="http://schemas.microsoft.com/office/drawing/2010/main" val="0"/>
+              </a:ext>
+            </a:extLst>
+          </a:blip>
+          <a:stretch>
+            <a:fillRect/>
+          </a:stretch>
+        </p:blipFill>
+        <p:spPr>
+          <a:xfrm>
+            <a:off x="2552700" y="1567147"/>
+            <a:ext cx="6877050" cy="4546032"/>
+          </a:xfrm>
+          <a:prstGeom prst="rect">
+            <a:avLst/>
+          </a:prstGeom>
+        </p:spPr>
+      </p:pic>
+    </p:spTree>
+    <p:extLst>
+      <p:ext uri="{BB962C8B-B14F-4D97-AF65-F5344CB8AC3E}">
+        <p14:creationId xmlns:p14="http://schemas.microsoft.com/office/powerpoint/2010/main" val="3272110822"/>
+      </p:ext>
+    </p:extLst>
+  </p:cSld>
+  <p:clrMapOvr>
+    <a:masterClrMapping/>
+  </p:clrMapOvr>
+</p:sld>
+</file>
+
+<file path=ppt/slides/slide14.xml><?xml version="1.0" encoding="utf-8"?>
+<p:sld xmlns:a="http://schemas.openxmlformats.org/drawingml/2006/main" xmlns:r="http://schemas.openxmlformats.org/officeDocument/2006/relationships" xmlns:p="http://schemas.openxmlformats.org/presentationml/2006/main">
+  <p:cSld>
+    <p:spTree>
+      <p:nvGrpSpPr>
+        <p:cNvPr id="1" name=""/>
+        <p:cNvGrpSpPr/>
+        <p:nvPr/>
+      </p:nvGrpSpPr>
+      <p:grpSpPr>
+        <a:xfrm>
+          <a:off x="0" y="0"/>
+          <a:ext cx="0" cy="0"/>
+          <a:chOff x="0" y="0"/>
+          <a:chExt cx="0" cy="0"/>
+        </a:xfrm>
+      </p:grpSpPr>
+      <p:sp>
+        <p:nvSpPr>
+          <p:cNvPr id="4" name="Title 3">
+            <a:extLst>
+              <a:ext uri="{FF2B5EF4-FFF2-40B4-BE49-F238E27FC236}">
+                <a16:creationId xmlns:a16="http://schemas.microsoft.com/office/drawing/2014/main" id="{8DB41184-8C94-46D3-9D80-4AC9E806E8D5}"/>
+              </a:ext>
+            </a:extLst>
+          </p:cNvPr>
+          <p:cNvSpPr>
+            <a:spLocks noGrp="1"/>
+          </p:cNvSpPr>
+          <p:nvPr>
+            <p:ph type="title"/>
+          </p:nvPr>
+        </p:nvSpPr>
+        <p:spPr>
+          <a:xfrm>
+            <a:off x="838200" y="212726"/>
+            <a:ext cx="10515600" cy="1111250"/>
+          </a:xfrm>
+        </p:spPr>
+        <p:txBody>
+          <a:bodyPr>
+            <a:normAutofit fontScale="90000"/>
+          </a:bodyPr>
+          <a:lstStyle/>
+          <a:p>
+            <a:pPr algn="ctr"/>
+            <a:r>
+              <a:rPr lang="en-US" sz="4400" dirty="0"/>
+              <a:t>Covid-19 Fully Vaccinated </a:t>
+            </a:r>
+            <a:br>
+              <a:rPr lang="en-US" sz="4400" dirty="0"/>
+            </a:br>
+            <a:r>
+              <a:rPr lang="en-US" sz="3100" dirty="0"/>
+              <a:t>(Least ten countries)</a:t>
+            </a:r>
+          </a:p>
+        </p:txBody>
+      </p:sp>
+      <p:sp>
+        <p:nvSpPr>
+          <p:cNvPr id="7" name="Footer Placeholder 6">
+            <a:extLst>
+              <a:ext uri="{FF2B5EF4-FFF2-40B4-BE49-F238E27FC236}">
+                <a16:creationId xmlns:a16="http://schemas.microsoft.com/office/drawing/2014/main" id="{840787EF-019F-4D4A-9C20-A253BA226D98}"/>
+              </a:ext>
+            </a:extLst>
+          </p:cNvPr>
+          <p:cNvSpPr>
+            <a:spLocks noGrp="1"/>
+          </p:cNvSpPr>
+          <p:nvPr>
+            <p:ph type="ftr" sz="quarter" idx="11"/>
+          </p:nvPr>
+        </p:nvSpPr>
+        <p:spPr/>
+        <p:txBody>
+          <a:bodyPr/>
+          <a:lstStyle/>
+          <a:p>
+            <a:pPr marL="0" marR="0" lvl="0" indent="0" algn="ctr" defTabSz="914400" rtl="0" eaLnBrk="1" fontAlgn="auto" latinLnBrk="0" hangingPunct="1">
+              <a:lnSpc>
+                <a:spcPct val="100000"/>
+              </a:lnSpc>
+              <a:spcBef>
+                <a:spcPts val="0"/>
+              </a:spcBef>
+              <a:spcAft>
+                <a:spcPts val="0"/>
+              </a:spcAft>
+              <a:buClrTx/>
+              <a:buSzTx/>
+              <a:buFontTx/>
+              <a:buNone/>
+              <a:tabLst/>
+              <a:defRPr/>
+            </a:pPr>
+            <a:r>
+              <a:rPr kumimoji="0" lang="en-US" sz="1200" b="0" i="0" u="none" strike="noStrike" kern="1200" cap="none" spc="0" normalizeH="0" baseline="0" noProof="0">
+                <a:ln>
+                  <a:noFill/>
+                </a:ln>
+                <a:solidFill>
+                  <a:prstClr val="black">
+                    <a:tint val="75000"/>
+                  </a:prstClr>
+                </a:solidFill>
+                <a:effectLst/>
+                <a:uLnTx/>
+                <a:uFillTx/>
+                <a:latin typeface="Calibri" panose="020F0502020204030204"/>
+                <a:ea typeface="+mn-ea"/>
+                <a:cs typeface="+mn-cs"/>
+              </a:rPr>
+              <a:t>https://github.com/makbarish/Grp5_Project1_Covid19</a:t>
+            </a:r>
+          </a:p>
+        </p:txBody>
+      </p:sp>
+      <p:sp>
+        <p:nvSpPr>
+          <p:cNvPr id="2" name="Date Placeholder 1">
+            <a:extLst>
+              <a:ext uri="{FF2B5EF4-FFF2-40B4-BE49-F238E27FC236}">
+                <a16:creationId xmlns:a16="http://schemas.microsoft.com/office/drawing/2014/main" id="{A346B64B-8A1C-43A1-84CB-2D58DBBC7959}"/>
+              </a:ext>
+            </a:extLst>
+          </p:cNvPr>
+          <p:cNvSpPr>
+            <a:spLocks noGrp="1"/>
+          </p:cNvSpPr>
+          <p:nvPr>
+            <p:ph type="dt" sz="half" idx="10"/>
+          </p:nvPr>
+        </p:nvSpPr>
+        <p:spPr/>
+        <p:txBody>
+          <a:bodyPr/>
+          <a:lstStyle/>
+          <a:p>
+            <a:pPr marL="0" marR="0" lvl="0" indent="0" algn="l" defTabSz="914400" rtl="0" eaLnBrk="1" fontAlgn="auto" latinLnBrk="0" hangingPunct="1">
+              <a:lnSpc>
+                <a:spcPct val="100000"/>
+              </a:lnSpc>
+              <a:spcBef>
+                <a:spcPts val="0"/>
+              </a:spcBef>
+              <a:spcAft>
+                <a:spcPts val="0"/>
+              </a:spcAft>
+              <a:buClrTx/>
+              <a:buSzTx/>
+              <a:buFontTx/>
+              <a:buNone/>
+              <a:tabLst/>
+              <a:defRPr/>
+            </a:pPr>
+            <a:r>
+              <a:rPr kumimoji="0" lang="en-US" sz="1200" b="0" i="0" u="none" strike="noStrike" kern="1200" cap="none" spc="0" normalizeH="0" baseline="0" noProof="0">
+                <a:ln>
+                  <a:noFill/>
+                </a:ln>
+                <a:solidFill>
+                  <a:prstClr val="black">
+                    <a:tint val="75000"/>
+                  </a:prstClr>
+                </a:solidFill>
+                <a:effectLst/>
+                <a:uLnTx/>
+                <a:uFillTx/>
+                <a:latin typeface="Calibri" panose="020F0502020204030204"/>
+                <a:ea typeface="+mn-ea"/>
+                <a:cs typeface="+mn-cs"/>
+              </a:rPr>
+              <a:t>6/9/2021</a:t>
+            </a:r>
+          </a:p>
+        </p:txBody>
+      </p:sp>
+      <p:sp>
+        <p:nvSpPr>
+          <p:cNvPr id="3" name="Slide Number Placeholder 2">
+            <a:extLst>
+              <a:ext uri="{FF2B5EF4-FFF2-40B4-BE49-F238E27FC236}">
+                <a16:creationId xmlns:a16="http://schemas.microsoft.com/office/drawing/2014/main" id="{0AB42B2B-D6AE-4A28-9832-61266DCC28CC}"/>
+              </a:ext>
+            </a:extLst>
+          </p:cNvPr>
+          <p:cNvSpPr>
+            <a:spLocks noGrp="1"/>
+          </p:cNvSpPr>
+          <p:nvPr>
+            <p:ph type="sldNum" sz="quarter" idx="12"/>
+          </p:nvPr>
+        </p:nvSpPr>
+        <p:spPr/>
+        <p:txBody>
+          <a:bodyPr/>
+          <a:lstStyle/>
+          <a:p>
+            <a:pPr marL="0" marR="0" lvl="0" indent="0" algn="r" defTabSz="914400" rtl="0" eaLnBrk="1" fontAlgn="auto" latinLnBrk="0" hangingPunct="1">
+              <a:lnSpc>
+                <a:spcPct val="100000"/>
+              </a:lnSpc>
+              <a:spcBef>
+                <a:spcPts val="0"/>
+              </a:spcBef>
+              <a:spcAft>
+                <a:spcPts val="0"/>
+              </a:spcAft>
+              <a:buClrTx/>
+              <a:buSzTx/>
+              <a:buFontTx/>
+              <a:buNone/>
+              <a:tabLst/>
+              <a:defRPr/>
+            </a:pPr>
+            <a:fld id="{3AA9003C-6A8E-4863-AB7A-EC3E1B799067}" type="slidenum">
+              <a:rPr kumimoji="0" lang="en-US" sz="1200" b="0" i="0" u="none" strike="noStrike" kern="1200" cap="none" spc="0" normalizeH="0" baseline="0" noProof="0" smtClean="0">
+                <a:ln>
+                  <a:noFill/>
+                </a:ln>
+                <a:solidFill>
+                  <a:prstClr val="black">
+                    <a:tint val="75000"/>
+                  </a:prstClr>
+                </a:solidFill>
+                <a:effectLst/>
+                <a:uLnTx/>
+                <a:uFillTx/>
+                <a:latin typeface="Calibri" panose="020F0502020204030204"/>
+                <a:ea typeface="+mn-ea"/>
+                <a:cs typeface="+mn-cs"/>
+              </a:rPr>
+              <a:pPr marL="0" marR="0" lvl="0" indent="0" algn="r" defTabSz="914400" rtl="0" eaLnBrk="1" fontAlgn="auto" latinLnBrk="0" hangingPunct="1">
+                <a:lnSpc>
+                  <a:spcPct val="100000"/>
+                </a:lnSpc>
+                <a:spcBef>
+                  <a:spcPts val="0"/>
+                </a:spcBef>
+                <a:spcAft>
+                  <a:spcPts val="0"/>
+                </a:spcAft>
+                <a:buClrTx/>
+                <a:buSzTx/>
+                <a:buFontTx/>
+                <a:buNone/>
+                <a:tabLst/>
+                <a:defRPr/>
+              </a:pPr>
+              <a:t>14</a:t>
+            </a:fld>
+            <a:endParaRPr kumimoji="0" lang="en-US" sz="1200" b="0" i="0" u="none" strike="noStrike" kern="1200" cap="none" spc="0" normalizeH="0" baseline="0" noProof="0">
+              <a:ln>
+                <a:noFill/>
+              </a:ln>
+              <a:solidFill>
+                <a:prstClr val="black">
+                  <a:tint val="75000"/>
+                </a:prstClr>
+              </a:solidFill>
+              <a:effectLst/>
+              <a:uLnTx/>
+              <a:uFillTx/>
+              <a:latin typeface="Calibri" panose="020F0502020204030204"/>
+              <a:ea typeface="+mn-ea"/>
+              <a:cs typeface="+mn-cs"/>
+            </a:endParaRPr>
+          </a:p>
+        </p:txBody>
+      </p:sp>
+      <p:pic>
+        <p:nvPicPr>
+          <p:cNvPr id="6" name="Picture 5">
+            <a:extLst>
+              <a:ext uri="{FF2B5EF4-FFF2-40B4-BE49-F238E27FC236}">
+                <a16:creationId xmlns:a16="http://schemas.microsoft.com/office/drawing/2014/main" id="{B0B8AD64-B553-47D7-B6E7-60DC575D4878}"/>
+              </a:ext>
+            </a:extLst>
+          </p:cNvPr>
+          <p:cNvPicPr>
+            <a:picLocks noChangeAspect="1"/>
+          </p:cNvPicPr>
+          <p:nvPr/>
+        </p:nvPicPr>
+        <p:blipFill>
+          <a:blip r:embed="rId2">
+            <a:extLst>
+              <a:ext uri="{28A0092B-C50C-407E-A947-70E740481C1C}">
+                <a14:useLocalDpi xmlns:a14="http://schemas.microsoft.com/office/drawing/2010/main" val="0"/>
+              </a:ext>
+            </a:extLst>
+          </a:blip>
+          <a:stretch>
+            <a:fillRect/>
+          </a:stretch>
+        </p:blipFill>
+        <p:spPr>
+          <a:xfrm>
+            <a:off x="2524125" y="1482726"/>
+            <a:ext cx="7162800" cy="4600574"/>
+          </a:xfrm>
+          <a:prstGeom prst="rect">
+            <a:avLst/>
+          </a:prstGeom>
+        </p:spPr>
+      </p:pic>
+    </p:spTree>
+    <p:extLst>
+      <p:ext uri="{BB962C8B-B14F-4D97-AF65-F5344CB8AC3E}">
+        <p14:creationId xmlns:p14="http://schemas.microsoft.com/office/powerpoint/2010/main" val="2739655371"/>
       </p:ext>
     </p:extLst>
   </p:cSld>
@@ -4178,7 +6065,7 @@
               <a:rPr lang="en-US" sz="4400" dirty="0"/>
             </a:br>
             <a:r>
-              <a:rPr lang="en-US" sz="4400" dirty="0"/>
+              <a:rPr lang="en-US" sz="4400" b="1" dirty="0"/>
               <a:t>Novel Corona Virus 2019</a:t>
             </a:r>
             <a:br>
@@ -4284,7 +6171,7 @@
             </a:pPr>
             <a:r>
               <a:rPr lang="en-US" dirty="0"/>
-              <a:t>Where did the Covid 19 outbreak originate?     </a:t>
+              <a:t>Where did the first Covid-19 cases get reported?     </a:t>
             </a:r>
           </a:p>
           <a:p>
@@ -4294,7 +6181,7 @@
             </a:pPr>
             <a:r>
               <a:rPr lang="en-US" dirty="0"/>
-              <a:t>Available vaccinations by manufacturer and country?   	</a:t>
+              <a:t>Availability vaccinations by manufacturer and country?   	</a:t>
             </a:r>
           </a:p>
           <a:p>
@@ -4304,7 +6191,7 @@
             </a:pPr>
             <a:r>
               <a:rPr lang="en-US" dirty="0"/>
-              <a:t>Does GDP and World population have any impact or influence on the covid 19 outbreak?</a:t>
+              <a:t>Does GDP and population have any impact or influence on the covid 19 outbreak?</a:t>
             </a:r>
           </a:p>
           <a:p>
@@ -4473,9 +6360,13 @@
           <a:p>
             <a:r>
               <a:rPr lang="en-US" sz="4400" dirty="0"/>
-              <a:t>Covid-19 Data Analytics</a:t>
-            </a:r>
-            <a:endParaRPr lang="en-US" dirty="0"/>
+              <a:t>                  </a:t>
+            </a:r>
+            <a:r>
+              <a:rPr lang="en-US" sz="4400" b="1" dirty="0"/>
+              <a:t>Novel Corona Virus 2019</a:t>
+            </a:r>
+            <a:endParaRPr lang="en-US" b="1" dirty="0"/>
           </a:p>
         </p:txBody>
       </p:sp>
@@ -4493,8 +6384,8 @@
         </p:nvSpPr>
         <p:spPr>
           <a:xfrm>
-            <a:off x="483393" y="2217835"/>
-            <a:ext cx="11225213" cy="2893100"/>
+            <a:off x="483393" y="2574887"/>
+            <a:ext cx="11225213" cy="3539430"/>
           </a:xfrm>
           <a:prstGeom prst="rect">
             <a:avLst/>
@@ -4509,7 +6400,7 @@
           <a:p>
             <a:r>
               <a:rPr lang="en-US" sz="1400" dirty="0"/>
-              <a:t>World Bank GDP Ranking</a:t>
+              <a:t>World Bank GDP Ranking for 2019</a:t>
             </a:r>
           </a:p>
           <a:p>
@@ -4527,7 +6418,7 @@
           <a:p>
             <a:r>
               <a:rPr lang="en-US" sz="1400" dirty="0"/>
-              <a:t>World Population of each country</a:t>
+              <a:t>World Population of each country for 2019</a:t>
             </a:r>
           </a:p>
           <a:p>
@@ -4547,51 +6438,37 @@
           <a:p>
             <a:r>
               <a:rPr lang="en-US" sz="1400" dirty="0"/>
-              <a:t>World Vaccinations </a:t>
-            </a:r>
-          </a:p>
-          <a:p>
-            <a:r>
-              <a:rPr lang="en-US" sz="1400" dirty="0">
-                <a:hlinkClick r:id="rId4"/>
-              </a:rPr>
-              <a:t>https://www.kaggle.com/xholisilemantshongo/vaccination-progress</a:t>
-            </a:r>
-          </a:p>
-          <a:p>
-            <a:r>
-              <a:rPr lang="en-US" sz="1400" dirty="0">
-                <a:hlinkClick r:id="rId4"/>
-              </a:rPr>
-              <a:t>https://www.kaggle.com/deblina00/insights-on-eda-of-covid19-world-vaccination</a:t>
-            </a:r>
-          </a:p>
-          <a:p>
-            <a:endParaRPr lang="en-US" sz="1400" dirty="0">
-              <a:hlinkClick r:id="rId4"/>
-            </a:endParaRPr>
-          </a:p>
-          <a:p>
-            <a:r>
-              <a:rPr lang="en-US" sz="1400" dirty="0"/>
-              <a:t>Johns Hopkins University (</a:t>
-            </a:r>
+              <a:t>World Vaccinations up to May 2021</a:t>
+            </a:r>
+          </a:p>
+          <a:p>
             <a:r>
               <a:rPr lang="en-US" sz="1400" dirty="0">
                 <a:hlinkClick r:id="rId5"/>
               </a:rPr>
-              <a:t>GitHub Repository</a:t>
-            </a:r>
+              <a:t>https://www.kaggle.com/xholisilemantshongo/vaccination-progress</a:t>
+            </a:r>
+            <a:endParaRPr lang="en-US" sz="1400" dirty="0"/>
+          </a:p>
+          <a:p>
+            <a:r>
+              <a:rPr lang="en-US" sz="1400" dirty="0">
+                <a:hlinkClick r:id="rId6"/>
+              </a:rPr>
+              <a:t>https://www.kaggle.com/deblina00/insights-on-eda-of-covid19-world-vaccination</a:t>
+            </a:r>
+            <a:endParaRPr lang="en-US" sz="1400" dirty="0"/>
+          </a:p>
+          <a:p>
+            <a:endParaRPr lang="en-US" sz="1400" dirty="0"/>
+          </a:p>
+          <a:p>
             <a:r>
               <a:rPr lang="en-US" sz="1400" dirty="0"/>
-              <a:t>)  -  Global Time Series on covid -19 affected cases – 3 separate files: Confirmed, Deaths, Recovered</a:t>
-            </a:r>
-          </a:p>
-          <a:p>
-            <a:r>
-              <a:rPr lang="en-US" sz="1400" dirty="0"/>
-              <a:t>World Health Organization </a:t>
-            </a:r>
+              <a:t>World Health Organization tables</a:t>
+            </a:r>
+          </a:p>
+          <a:p>
             <a:r>
               <a:rPr lang="en-US" sz="1400" dirty="0">
                 <a:hlinkClick r:id="rId4"/>
@@ -4600,27 +6477,42 @@
             </a:r>
             <a:r>
               <a:rPr lang="en-US" sz="1400" dirty="0"/>
-              <a:t>. </a:t>
-            </a:r>
-            <a:r>
-              <a:rPr lang="en-US" sz="1400" b="0" i="0" dirty="0">
-                <a:effectLst/>
-                <a:latin typeface="Inter"/>
+              <a:t> </a:t>
+            </a:r>
+          </a:p>
+          <a:p>
+            <a:r>
+              <a:rPr lang="en-US" sz="1400" dirty="0"/>
+              <a:t>Global Time Series on covid -19 affected cases – 3 separate files: Confirmed, Deaths, Recovered</a:t>
+            </a:r>
+            <a:endParaRPr lang="en-US" sz="1400" dirty="0">
+              <a:hlinkClick r:id="rId4"/>
+            </a:endParaRPr>
+          </a:p>
+          <a:p>
+            <a:endParaRPr lang="en-US" sz="1400" dirty="0"/>
+          </a:p>
+          <a:p>
+            <a:r>
+              <a:rPr lang="en-US" sz="1400" dirty="0"/>
+              <a:t>Optional data,  not used in analysis:</a:t>
+            </a:r>
+          </a:p>
+          <a:p>
+            <a:r>
+              <a:rPr lang="en-US" sz="1400" dirty="0"/>
+              <a:t>Johns Hopkins University (</a:t>
+            </a:r>
+            <a:r>
+              <a:rPr lang="en-US" sz="1400" dirty="0">
+                <a:hlinkClick r:id="rId7"/>
               </a:rPr>
-              <a:t>Data is extracted by </a:t>
+              <a:t>GitHub Repository</a:t>
             </a:r>
             <a:r>
               <a:rPr lang="en-US" sz="1400" dirty="0"/>
-              <a:t>Johns Hopkins University using</a:t>
-            </a:r>
-            <a:r>
-              <a:rPr lang="en-US" sz="1400" b="0" i="0" dirty="0">
-                <a:effectLst/>
-                <a:latin typeface="Inter"/>
-              </a:rPr>
-              <a:t> google sheets and made available in Kaggle.com</a:t>
-            </a:r>
-            <a:endParaRPr lang="en-US" sz="1400" dirty="0"/>
+              <a:t>) </a:t>
+            </a:r>
           </a:p>
         </p:txBody>
       </p:sp>
@@ -4638,8 +6530,8 @@
         </p:nvSpPr>
         <p:spPr>
           <a:xfrm>
-            <a:off x="483393" y="1796442"/>
-            <a:ext cx="7267575" cy="369332"/>
+            <a:off x="483393" y="1700648"/>
+            <a:ext cx="7279482" cy="923330"/>
           </a:xfrm>
           <a:prstGeom prst="rect">
             <a:avLst/>
@@ -4654,7 +6546,26 @@
           <a:p>
             <a:r>
               <a:rPr lang="en-US" dirty="0"/>
-              <a:t>Source Data used for answering team questions: </a:t>
+              <a:t>Source Data used for answering team questions:</a:t>
+            </a:r>
+          </a:p>
+          <a:p>
+            <a:r>
+              <a:rPr lang="en-US" dirty="0"/>
+              <a:t>Primary Sources from </a:t>
+            </a:r>
+            <a:r>
+              <a:rPr lang="en-US" dirty="0">
+                <a:hlinkClick r:id="rId8"/>
+              </a:rPr>
+              <a:t>www.Kaggle.com</a:t>
+            </a:r>
+            <a:endParaRPr lang="en-US" dirty="0"/>
+          </a:p>
+          <a:p>
+            <a:r>
+              <a:rPr lang="en-US" dirty="0"/>
+              <a:t> </a:t>
             </a:r>
           </a:p>
         </p:txBody>
@@ -4805,11 +6716,11 @@
             <a:pPr algn="ctr"/>
             <a:r>
               <a:rPr lang="en-US" sz="4400" dirty="0"/>
-              <a:t>Covid-19 </a:t>
+              <a:t>Covid-19 Cumulative Global </a:t>
             </a:r>
             <a:r>
               <a:rPr lang="en-US" dirty="0"/>
-              <a:t>Confirmed</a:t>
+              <a:t>Cases</a:t>
             </a:r>
           </a:p>
         </p:txBody>
@@ -4839,15 +6750,72 @@
               <a:rPr lang="en-US"/>
               <a:t>https://github.com/makbarish/Grp5_Project1_Covid19</a:t>
             </a:r>
+          </a:p>
+        </p:txBody>
+      </p:sp>
+      <p:sp>
+        <p:nvSpPr>
+          <p:cNvPr id="2" name="Date Placeholder 1">
+            <a:extLst>
+              <a:ext uri="{FF2B5EF4-FFF2-40B4-BE49-F238E27FC236}">
+                <a16:creationId xmlns:a16="http://schemas.microsoft.com/office/drawing/2014/main" id="{A346B64B-8A1C-43A1-84CB-2D58DBBC7959}"/>
+              </a:ext>
+            </a:extLst>
+          </p:cNvPr>
+          <p:cNvSpPr>
+            <a:spLocks noGrp="1"/>
+          </p:cNvSpPr>
+          <p:nvPr>
+            <p:ph type="dt" sz="half" idx="10"/>
+          </p:nvPr>
+        </p:nvSpPr>
+        <p:spPr/>
+        <p:txBody>
+          <a:bodyPr/>
+          <a:lstStyle/>
+          <a:p>
+            <a:r>
+              <a:rPr lang="en-US"/>
+              <a:t>6/9/2021</a:t>
+            </a:r>
+          </a:p>
+        </p:txBody>
+      </p:sp>
+      <p:sp>
+        <p:nvSpPr>
+          <p:cNvPr id="3" name="Slide Number Placeholder 2">
+            <a:extLst>
+              <a:ext uri="{FF2B5EF4-FFF2-40B4-BE49-F238E27FC236}">
+                <a16:creationId xmlns:a16="http://schemas.microsoft.com/office/drawing/2014/main" id="{0AB42B2B-D6AE-4A28-9832-61266DCC28CC}"/>
+              </a:ext>
+            </a:extLst>
+          </p:cNvPr>
+          <p:cNvSpPr>
+            <a:spLocks noGrp="1"/>
+          </p:cNvSpPr>
+          <p:nvPr>
+            <p:ph type="sldNum" sz="quarter" idx="12"/>
+          </p:nvPr>
+        </p:nvSpPr>
+        <p:spPr/>
+        <p:txBody>
+          <a:bodyPr/>
+          <a:lstStyle/>
+          <a:p>
+            <a:fld id="{3AA9003C-6A8E-4863-AB7A-EC3E1B799067}" type="slidenum">
+              <a:rPr lang="en-US" smtClean="0"/>
+              <a:t>4</a:t>
+            </a:fld>
+            <a:endParaRPr lang="en-US"/>
           </a:p>
         </p:txBody>
       </p:sp>
       <p:pic>
         <p:nvPicPr>
-          <p:cNvPr id="6" name="Picture 5">
-            <a:extLst>
-              <a:ext uri="{FF2B5EF4-FFF2-40B4-BE49-F238E27FC236}">
-                <a16:creationId xmlns:a16="http://schemas.microsoft.com/office/drawing/2014/main" id="{29D670D8-C063-4371-965C-2BAB10A818E1}"/>
+          <p:cNvPr id="5" name="Picture 4">
+            <a:extLst>
+              <a:ext uri="{FF2B5EF4-FFF2-40B4-BE49-F238E27FC236}">
+                <a16:creationId xmlns:a16="http://schemas.microsoft.com/office/drawing/2014/main" id="{CC497F15-0ECB-4058-ABF5-62C197E92CC4}"/>
               </a:ext>
             </a:extLst>
           </p:cNvPr>
@@ -4857,84 +6825,21 @@
           <p:nvPr/>
         </p:nvPicPr>
         <p:blipFill>
-          <a:blip r:embed="rId2">
-            <a:extLst>
-              <a:ext uri="{28A0092B-C50C-407E-A947-70E740481C1C}">
-                <a14:useLocalDpi xmlns:a14="http://schemas.microsoft.com/office/drawing/2010/main" val="0"/>
-              </a:ext>
-            </a:extLst>
-          </a:blip>
+          <a:blip r:embed="rId2"/>
           <a:stretch>
             <a:fillRect/>
           </a:stretch>
         </p:blipFill>
         <p:spPr>
           <a:xfrm>
-            <a:off x="1523991" y="1142995"/>
-            <a:ext cx="9144018" cy="4572009"/>
+            <a:off x="452807" y="827074"/>
+            <a:ext cx="11286386" cy="5643192"/>
           </a:xfrm>
           <a:prstGeom prst="rect">
             <a:avLst/>
           </a:prstGeom>
         </p:spPr>
       </p:pic>
-      <p:sp>
-        <p:nvSpPr>
-          <p:cNvPr id="2" name="Date Placeholder 1">
-            <a:extLst>
-              <a:ext uri="{FF2B5EF4-FFF2-40B4-BE49-F238E27FC236}">
-                <a16:creationId xmlns:a16="http://schemas.microsoft.com/office/drawing/2014/main" id="{A346B64B-8A1C-43A1-84CB-2D58DBBC7959}"/>
-              </a:ext>
-            </a:extLst>
-          </p:cNvPr>
-          <p:cNvSpPr>
-            <a:spLocks noGrp="1"/>
-          </p:cNvSpPr>
-          <p:nvPr>
-            <p:ph type="dt" sz="half" idx="10"/>
-          </p:nvPr>
-        </p:nvSpPr>
-        <p:spPr/>
-        <p:txBody>
-          <a:bodyPr/>
-          <a:lstStyle/>
-          <a:p>
-            <a:r>
-              <a:rPr lang="en-US"/>
-              <a:t>6/9/2021</a:t>
-            </a:r>
-          </a:p>
-        </p:txBody>
-      </p:sp>
-      <p:sp>
-        <p:nvSpPr>
-          <p:cNvPr id="3" name="Slide Number Placeholder 2">
-            <a:extLst>
-              <a:ext uri="{FF2B5EF4-FFF2-40B4-BE49-F238E27FC236}">
-                <a16:creationId xmlns:a16="http://schemas.microsoft.com/office/drawing/2014/main" id="{0AB42B2B-D6AE-4A28-9832-61266DCC28CC}"/>
-              </a:ext>
-            </a:extLst>
-          </p:cNvPr>
-          <p:cNvSpPr>
-            <a:spLocks noGrp="1"/>
-          </p:cNvSpPr>
-          <p:nvPr>
-            <p:ph type="sldNum" sz="quarter" idx="12"/>
-          </p:nvPr>
-        </p:nvSpPr>
-        <p:spPr/>
-        <p:txBody>
-          <a:bodyPr/>
-          <a:lstStyle/>
-          <a:p>
-            <a:fld id="{3AA9003C-6A8E-4863-AB7A-EC3E1B799067}" type="slidenum">
-              <a:rPr lang="en-US" smtClean="0"/>
-              <a:t>4</a:t>
-            </a:fld>
-            <a:endParaRPr lang="en-US"/>
-          </a:p>
-        </p:txBody>
-      </p:sp>
     </p:spTree>
     <p:extLst>
       <p:ext uri="{BB962C8B-B14F-4D97-AF65-F5344CB8AC3E}">
@@ -4996,11 +6901,11 @@
             <a:pPr algn="ctr"/>
             <a:r>
               <a:rPr lang="en-US" sz="4400" dirty="0"/>
-              <a:t>Covid-19 </a:t>
+              <a:t>Covid-19 Cumulative D</a:t>
             </a:r>
             <a:r>
               <a:rPr lang="en-US" dirty="0"/>
-              <a:t>Confirmed</a:t>
+              <a:t>eaths</a:t>
             </a:r>
           </a:p>
         </p:txBody>
@@ -5035,10 +6940,10 @@
       </p:sp>
       <p:pic>
         <p:nvPicPr>
-          <p:cNvPr id="10" name="Picture 9">
-            <a:extLst>
-              <a:ext uri="{FF2B5EF4-FFF2-40B4-BE49-F238E27FC236}">
-                <a16:creationId xmlns:a16="http://schemas.microsoft.com/office/drawing/2014/main" id="{54CE7C67-3A44-4946-949D-6AA36CB0AF7C}"/>
+          <p:cNvPr id="6" name="Picture 5">
+            <a:extLst>
+              <a:ext uri="{FF2B5EF4-FFF2-40B4-BE49-F238E27FC236}">
+                <a16:creationId xmlns:a16="http://schemas.microsoft.com/office/drawing/2014/main" id="{A7477253-1BE9-47F8-A8A9-583B5D1E9E22}"/>
               </a:ext>
             </a:extLst>
           </p:cNvPr>
@@ -5061,8 +6966,8 @@
         </p:blipFill>
         <p:spPr>
           <a:xfrm>
-            <a:off x="838200" y="1323976"/>
-            <a:ext cx="10382250" cy="4924424"/>
+            <a:off x="651536" y="1005218"/>
+            <a:ext cx="10702264" cy="5351132"/>
           </a:xfrm>
           <a:prstGeom prst="rect">
             <a:avLst/>
@@ -5074,7 +6979,7 @@
           <p:cNvPr id="2" name="Date Placeholder 1">
             <a:extLst>
               <a:ext uri="{FF2B5EF4-FFF2-40B4-BE49-F238E27FC236}">
-                <a16:creationId xmlns:a16="http://schemas.microsoft.com/office/drawing/2014/main" id="{CE111FD5-1624-4334-A846-9C24666282CB}"/>
+                <a16:creationId xmlns:a16="http://schemas.microsoft.com/office/drawing/2014/main" id="{6C419240-CD98-4A21-9958-9386673CEE6A}"/>
               </a:ext>
             </a:extLst>
           </p:cNvPr>
@@ -5102,7 +7007,7 @@
           <p:cNvPr id="3" name="Slide Number Placeholder 2">
             <a:extLst>
               <a:ext uri="{FF2B5EF4-FFF2-40B4-BE49-F238E27FC236}">
-                <a16:creationId xmlns:a16="http://schemas.microsoft.com/office/drawing/2014/main" id="{910F95B8-A89A-4B13-B11E-F560AFA251E7}"/>
+                <a16:creationId xmlns:a16="http://schemas.microsoft.com/office/drawing/2014/main" id="{AA7EB985-1B22-4FAE-A266-3467DAF49DA9}"/>
               </a:ext>
             </a:extLst>
           </p:cNvPr>
@@ -5129,7 +7034,7 @@
     </p:spTree>
     <p:extLst>
       <p:ext uri="{BB962C8B-B14F-4D97-AF65-F5344CB8AC3E}">
-        <p14:creationId xmlns:p14="http://schemas.microsoft.com/office/powerpoint/2010/main" val="1390846523"/>
+        <p14:creationId xmlns:p14="http://schemas.microsoft.com/office/powerpoint/2010/main" val="325095953"/>
       </p:ext>
     </p:extLst>
   </p:cSld>
@@ -5187,12 +7092,9 @@
             <a:pPr algn="ctr"/>
             <a:r>
               <a:rPr lang="en-US" sz="4400" dirty="0"/>
-              <a:t>Covid-19 </a:t>
-            </a:r>
-            <a:r>
-              <a:rPr lang="en-US" dirty="0"/>
-              <a:t>Confirmed</a:t>
-            </a:r>
+              <a:t>Covid-19 Cumulative Recoveries</a:t>
+            </a:r>
+            <a:endParaRPr lang="en-US" dirty="0"/>
           </a:p>
         </p:txBody>
       </p:sp>
@@ -5221,15 +7123,57 @@
               <a:rPr lang="en-US"/>
               <a:t>https://github.com/makbarish/Grp5_Project1_Covid19</a:t>
             </a:r>
+          </a:p>
+        </p:txBody>
+      </p:sp>
+      <p:sp>
+        <p:nvSpPr>
+          <p:cNvPr id="5" name="TextBox 4">
+            <a:extLst>
+              <a:ext uri="{FF2B5EF4-FFF2-40B4-BE49-F238E27FC236}">
+                <a16:creationId xmlns:a16="http://schemas.microsoft.com/office/drawing/2014/main" id="{62497FB6-6000-4F3C-BC2A-ACD4EE45972C}"/>
+              </a:ext>
+            </a:extLst>
+          </p:cNvPr>
+          <p:cNvSpPr txBox="1"/>
+          <p:nvPr/>
+        </p:nvSpPr>
+        <p:spPr>
+          <a:xfrm>
+            <a:off x="1000130" y="5715004"/>
+            <a:ext cx="10601320" cy="523220"/>
+          </a:xfrm>
+          <a:prstGeom prst="rect">
+            <a:avLst/>
+          </a:prstGeom>
+          <a:noFill/>
+        </p:spPr>
+        <p:txBody>
+          <a:bodyPr wrap="square" rtlCol="0">
+            <a:spAutoFit/>
+          </a:bodyPr>
+          <a:lstStyle/>
+          <a:p>
+            <a:r>
+              <a:rPr lang="en-US" sz="1400" b="0" i="0" dirty="0">
+                <a:solidFill>
+                  <a:srgbClr val="000000"/>
+                </a:solidFill>
+                <a:effectLst/>
+                <a:latin typeface="Helvetica Neue"/>
+              </a:rPr>
+              <a:t>Note: Effective 12/14/2020, the US discontinued reporting the number of recoveries on a daily bases. This represents a 6.3M adjustment to cumulative recoveries. The US has continued to report "zero" recoveries since.</a:t>
+            </a:r>
+            <a:endParaRPr lang="en-US" sz="1400" dirty="0"/>
           </a:p>
         </p:txBody>
       </p:sp>
       <p:pic>
         <p:nvPicPr>
-          <p:cNvPr id="3" name="Picture 2">
-            <a:extLst>
-              <a:ext uri="{FF2B5EF4-FFF2-40B4-BE49-F238E27FC236}">
-                <a16:creationId xmlns:a16="http://schemas.microsoft.com/office/drawing/2014/main" id="{7D9BA2C6-8D22-40EE-8EC7-EB759B4FC54F}"/>
+          <p:cNvPr id="11" name="Picture 10">
+            <a:extLst>
+              <a:ext uri="{FF2B5EF4-FFF2-40B4-BE49-F238E27FC236}">
+                <a16:creationId xmlns:a16="http://schemas.microsoft.com/office/drawing/2014/main" id="{51E7C336-B13F-47C7-B68C-40E48631ADB5}"/>
               </a:ext>
             </a:extLst>
           </p:cNvPr>
@@ -5252,8 +7196,8 @@
         </p:blipFill>
         <p:spPr>
           <a:xfrm>
-            <a:off x="1414462" y="1052039"/>
-            <a:ext cx="9363075" cy="4891561"/>
+            <a:off x="1523991" y="1142995"/>
+            <a:ext cx="9144018" cy="4572009"/>
           </a:xfrm>
           <a:prstGeom prst="rect">
             <a:avLst/>
@@ -5262,52 +7206,10 @@
       </p:pic>
       <p:sp>
         <p:nvSpPr>
-          <p:cNvPr id="5" name="TextBox 4">
-            <a:extLst>
-              <a:ext uri="{FF2B5EF4-FFF2-40B4-BE49-F238E27FC236}">
-                <a16:creationId xmlns:a16="http://schemas.microsoft.com/office/drawing/2014/main" id="{9B0CCC52-616C-4510-AFAD-655A9A63DD80}"/>
-              </a:ext>
-            </a:extLst>
-          </p:cNvPr>
-          <p:cNvSpPr txBox="1"/>
-          <p:nvPr/>
-        </p:nvSpPr>
-        <p:spPr>
-          <a:xfrm>
-            <a:off x="1323973" y="6019170"/>
-            <a:ext cx="10267951" cy="261610"/>
-          </a:xfrm>
-          <a:prstGeom prst="rect">
-            <a:avLst/>
-          </a:prstGeom>
-          <a:noFill/>
-        </p:spPr>
-        <p:txBody>
-          <a:bodyPr wrap="square" rtlCol="0">
-            <a:spAutoFit/>
-          </a:bodyPr>
-          <a:lstStyle/>
-          <a:p>
-            <a:r>
-              <a:rPr lang="en-US" sz="1100" b="0" i="0" dirty="0">
-                <a:solidFill>
-                  <a:srgbClr val="111111"/>
-                </a:solidFill>
-                <a:effectLst/>
-                <a:latin typeface="Roboto" panose="020B0604020202020204" pitchFamily="2" charset="0"/>
-              </a:rPr>
-              <a:t>Islands in the Pacific and Atlantic oceans, and are likely benefiting by bordering only the sea. Strict travel policies may be responsible for low confirmed cases.</a:t>
-            </a:r>
-            <a:endParaRPr lang="en-US" sz="1100" dirty="0"/>
-          </a:p>
-        </p:txBody>
-      </p:sp>
-      <p:sp>
-        <p:nvSpPr>
           <p:cNvPr id="2" name="Date Placeholder 1">
             <a:extLst>
               <a:ext uri="{FF2B5EF4-FFF2-40B4-BE49-F238E27FC236}">
-                <a16:creationId xmlns:a16="http://schemas.microsoft.com/office/drawing/2014/main" id="{FD4F8885-1BA1-4A21-B26E-698C6CA07AE3}"/>
+                <a16:creationId xmlns:a16="http://schemas.microsoft.com/office/drawing/2014/main" id="{3B79FA7B-69BC-488B-B316-CB86E20223AD}"/>
               </a:ext>
             </a:extLst>
           </p:cNvPr>
@@ -5332,10 +7234,10 @@
       </p:sp>
       <p:sp>
         <p:nvSpPr>
-          <p:cNvPr id="6" name="Slide Number Placeholder 5">
-            <a:extLst>
-              <a:ext uri="{FF2B5EF4-FFF2-40B4-BE49-F238E27FC236}">
-                <a16:creationId xmlns:a16="http://schemas.microsoft.com/office/drawing/2014/main" id="{BF207949-8D44-484D-B380-56DA9C57DF9B}"/>
+          <p:cNvPr id="3" name="Slide Number Placeholder 2">
+            <a:extLst>
+              <a:ext uri="{FF2B5EF4-FFF2-40B4-BE49-F238E27FC236}">
+                <a16:creationId xmlns:a16="http://schemas.microsoft.com/office/drawing/2014/main" id="{0DFFB120-079C-420E-B6A4-6C524385ABD9}"/>
               </a:ext>
             </a:extLst>
           </p:cNvPr>
@@ -5362,7 +7264,7 @@
     </p:spTree>
     <p:extLst>
       <p:ext uri="{BB962C8B-B14F-4D97-AF65-F5344CB8AC3E}">
-        <p14:creationId xmlns:p14="http://schemas.microsoft.com/office/powerpoint/2010/main" val="2811856403"/>
+        <p14:creationId xmlns:p14="http://schemas.microsoft.com/office/powerpoint/2010/main" val="821407823"/>
       </p:ext>
     </p:extLst>
   </p:cSld>
@@ -5420,11 +7322,11 @@
             <a:pPr algn="ctr"/>
             <a:r>
               <a:rPr lang="en-US" sz="4400" dirty="0"/>
-              <a:t>Covid-19 D</a:t>
+              <a:t>Covid-19 </a:t>
             </a:r>
             <a:r>
               <a:rPr lang="en-US" dirty="0"/>
-              <a:t>eaths</a:t>
+              <a:t>Confirmed (over 1million reported)</a:t>
             </a:r>
           </a:p>
         </p:txBody>
@@ -5459,10 +7361,10 @@
       </p:sp>
       <p:pic>
         <p:nvPicPr>
-          <p:cNvPr id="6" name="Picture 5">
-            <a:extLst>
-              <a:ext uri="{FF2B5EF4-FFF2-40B4-BE49-F238E27FC236}">
-                <a16:creationId xmlns:a16="http://schemas.microsoft.com/office/drawing/2014/main" id="{A7477253-1BE9-47F8-A8A9-583B5D1E9E22}"/>
+          <p:cNvPr id="10" name="Picture 9">
+            <a:extLst>
+              <a:ext uri="{FF2B5EF4-FFF2-40B4-BE49-F238E27FC236}">
+                <a16:creationId xmlns:a16="http://schemas.microsoft.com/office/drawing/2014/main" id="{54CE7C67-3A44-4946-949D-6AA36CB0AF7C}"/>
               </a:ext>
             </a:extLst>
           </p:cNvPr>
@@ -5485,8 +7387,8 @@
         </p:blipFill>
         <p:spPr>
           <a:xfrm>
-            <a:off x="1523991" y="1142995"/>
-            <a:ext cx="9144018" cy="4572009"/>
+            <a:off x="838200" y="1323976"/>
+            <a:ext cx="10382250" cy="4924424"/>
           </a:xfrm>
           <a:prstGeom prst="rect">
             <a:avLst/>
@@ -5498,7 +7400,7 @@
           <p:cNvPr id="2" name="Date Placeholder 1">
             <a:extLst>
               <a:ext uri="{FF2B5EF4-FFF2-40B4-BE49-F238E27FC236}">
-                <a16:creationId xmlns:a16="http://schemas.microsoft.com/office/drawing/2014/main" id="{6C419240-CD98-4A21-9958-9386673CEE6A}"/>
+                <a16:creationId xmlns:a16="http://schemas.microsoft.com/office/drawing/2014/main" id="{CE111FD5-1624-4334-A846-9C24666282CB}"/>
               </a:ext>
             </a:extLst>
           </p:cNvPr>
@@ -5526,7 +7428,7 @@
           <p:cNvPr id="3" name="Slide Number Placeholder 2">
             <a:extLst>
               <a:ext uri="{FF2B5EF4-FFF2-40B4-BE49-F238E27FC236}">
-                <a16:creationId xmlns:a16="http://schemas.microsoft.com/office/drawing/2014/main" id="{AA7EB985-1B22-4FAE-A266-3467DAF49DA9}"/>
+                <a16:creationId xmlns:a16="http://schemas.microsoft.com/office/drawing/2014/main" id="{910F95B8-A89A-4B13-B11E-F560AFA251E7}"/>
               </a:ext>
             </a:extLst>
           </p:cNvPr>
@@ -5553,7 +7455,7 @@
     </p:spTree>
     <p:extLst>
       <p:ext uri="{BB962C8B-B14F-4D97-AF65-F5344CB8AC3E}">
-        <p14:creationId xmlns:p14="http://schemas.microsoft.com/office/powerpoint/2010/main" val="325095953"/>
+        <p14:creationId xmlns:p14="http://schemas.microsoft.com/office/powerpoint/2010/main" val="1390846523"/>
       </p:ext>
     </p:extLst>
   </p:cSld>
@@ -5604,16 +7506,19 @@
         </p:spPr>
         <p:txBody>
           <a:bodyPr>
-            <a:normAutofit/>
+            <a:normAutofit fontScale="90000"/>
           </a:bodyPr>
           <a:lstStyle/>
           <a:p>
             <a:pPr algn="ctr"/>
             <a:r>
               <a:rPr lang="en-US" sz="4400" dirty="0"/>
-              <a:t>Covid-19 Recoveries</a:t>
-            </a:r>
-            <a:endParaRPr lang="en-US" dirty="0"/>
+              <a:t>Covid-19 </a:t>
+            </a:r>
+            <a:r>
+              <a:rPr lang="en-US" dirty="0"/>
+              <a:t>Confirmed (less than 600 cases reported)</a:t>
+            </a:r>
           </a:p>
         </p:txBody>
       </p:sp>
@@ -5642,57 +7547,15 @@
               <a:rPr lang="en-US"/>
               <a:t>https://github.com/makbarish/Grp5_Project1_Covid19</a:t>
             </a:r>
-          </a:p>
-        </p:txBody>
-      </p:sp>
-      <p:sp>
-        <p:nvSpPr>
-          <p:cNvPr id="5" name="TextBox 4">
-            <a:extLst>
-              <a:ext uri="{FF2B5EF4-FFF2-40B4-BE49-F238E27FC236}">
-                <a16:creationId xmlns:a16="http://schemas.microsoft.com/office/drawing/2014/main" id="{62497FB6-6000-4F3C-BC2A-ACD4EE45972C}"/>
-              </a:ext>
-            </a:extLst>
-          </p:cNvPr>
-          <p:cNvSpPr txBox="1"/>
-          <p:nvPr/>
-        </p:nvSpPr>
-        <p:spPr>
-          <a:xfrm>
-            <a:off x="1000130" y="5715004"/>
-            <a:ext cx="10601320" cy="523220"/>
-          </a:xfrm>
-          <a:prstGeom prst="rect">
-            <a:avLst/>
-          </a:prstGeom>
-          <a:noFill/>
-        </p:spPr>
-        <p:txBody>
-          <a:bodyPr wrap="square" rtlCol="0">
-            <a:spAutoFit/>
-          </a:bodyPr>
-          <a:lstStyle/>
-          <a:p>
-            <a:r>
-              <a:rPr lang="en-US" sz="1400" b="0" i="0" dirty="0">
-                <a:solidFill>
-                  <a:srgbClr val="000000"/>
-                </a:solidFill>
-                <a:effectLst/>
-                <a:latin typeface="Helvetica Neue"/>
-              </a:rPr>
-              <a:t>Note: Effective 12/14/2020, the US discontinued reporting the number of recoveries on a daily bases. This represents a 6.3M adjustment to cumulative recoveries. The US has continued to report "zero" recoveries since.</a:t>
-            </a:r>
-            <a:endParaRPr lang="en-US" sz="1400" dirty="0"/>
           </a:p>
         </p:txBody>
       </p:sp>
       <p:pic>
         <p:nvPicPr>
-          <p:cNvPr id="11" name="Picture 10">
-            <a:extLst>
-              <a:ext uri="{FF2B5EF4-FFF2-40B4-BE49-F238E27FC236}">
-                <a16:creationId xmlns:a16="http://schemas.microsoft.com/office/drawing/2014/main" id="{51E7C336-B13F-47C7-B68C-40E48631ADB5}"/>
+          <p:cNvPr id="3" name="Picture 2">
+            <a:extLst>
+              <a:ext uri="{FF2B5EF4-FFF2-40B4-BE49-F238E27FC236}">
+                <a16:creationId xmlns:a16="http://schemas.microsoft.com/office/drawing/2014/main" id="{7D9BA2C6-8D22-40EE-8EC7-EB759B4FC54F}"/>
               </a:ext>
             </a:extLst>
           </p:cNvPr>
@@ -5715,8 +7578,8 @@
         </p:blipFill>
         <p:spPr>
           <a:xfrm>
-            <a:off x="1523991" y="1142995"/>
-            <a:ext cx="9144018" cy="4572009"/>
+            <a:off x="1414462" y="1052039"/>
+            <a:ext cx="9363075" cy="4891561"/>
           </a:xfrm>
           <a:prstGeom prst="rect">
             <a:avLst/>
@@ -5725,10 +7588,52 @@
       </p:pic>
       <p:sp>
         <p:nvSpPr>
+          <p:cNvPr id="5" name="TextBox 4">
+            <a:extLst>
+              <a:ext uri="{FF2B5EF4-FFF2-40B4-BE49-F238E27FC236}">
+                <a16:creationId xmlns:a16="http://schemas.microsoft.com/office/drawing/2014/main" id="{9B0CCC52-616C-4510-AFAD-655A9A63DD80}"/>
+              </a:ext>
+            </a:extLst>
+          </p:cNvPr>
+          <p:cNvSpPr txBox="1"/>
+          <p:nvPr/>
+        </p:nvSpPr>
+        <p:spPr>
+          <a:xfrm>
+            <a:off x="1323973" y="6019170"/>
+            <a:ext cx="10267951" cy="261610"/>
+          </a:xfrm>
+          <a:prstGeom prst="rect">
+            <a:avLst/>
+          </a:prstGeom>
+          <a:noFill/>
+        </p:spPr>
+        <p:txBody>
+          <a:bodyPr wrap="square" rtlCol="0">
+            <a:spAutoFit/>
+          </a:bodyPr>
+          <a:lstStyle/>
+          <a:p>
+            <a:r>
+              <a:rPr lang="en-US" sz="1100" b="0" i="0" dirty="0">
+                <a:solidFill>
+                  <a:srgbClr val="111111"/>
+                </a:solidFill>
+                <a:effectLst/>
+                <a:latin typeface="Roboto" panose="020B0604020202020204" pitchFamily="2" charset="0"/>
+              </a:rPr>
+              <a:t>Islands in the Pacific and Atlantic oceans, and are likely benefiting by bordering only the sea. Strict travel policies may be responsible for low confirmed cases.</a:t>
+            </a:r>
+            <a:endParaRPr lang="en-US" sz="1100" dirty="0"/>
+          </a:p>
+        </p:txBody>
+      </p:sp>
+      <p:sp>
+        <p:nvSpPr>
           <p:cNvPr id="2" name="Date Placeholder 1">
             <a:extLst>
               <a:ext uri="{FF2B5EF4-FFF2-40B4-BE49-F238E27FC236}">
-                <a16:creationId xmlns:a16="http://schemas.microsoft.com/office/drawing/2014/main" id="{3B79FA7B-69BC-488B-B316-CB86E20223AD}"/>
+                <a16:creationId xmlns:a16="http://schemas.microsoft.com/office/drawing/2014/main" id="{FD4F8885-1BA1-4A21-B26E-698C6CA07AE3}"/>
               </a:ext>
             </a:extLst>
           </p:cNvPr>
@@ -5753,10 +7658,10 @@
       </p:sp>
       <p:sp>
         <p:nvSpPr>
-          <p:cNvPr id="3" name="Slide Number Placeholder 2">
-            <a:extLst>
-              <a:ext uri="{FF2B5EF4-FFF2-40B4-BE49-F238E27FC236}">
-                <a16:creationId xmlns:a16="http://schemas.microsoft.com/office/drawing/2014/main" id="{0DFFB120-079C-420E-B6A4-6C524385ABD9}"/>
+          <p:cNvPr id="6" name="Slide Number Placeholder 5">
+            <a:extLst>
+              <a:ext uri="{FF2B5EF4-FFF2-40B4-BE49-F238E27FC236}">
+                <a16:creationId xmlns:a16="http://schemas.microsoft.com/office/drawing/2014/main" id="{BF207949-8D44-484D-B380-56DA9C57DF9B}"/>
               </a:ext>
             </a:extLst>
           </p:cNvPr>
@@ -5783,7 +7688,7 @@
     </p:spTree>
     <p:extLst>
       <p:ext uri="{BB962C8B-B14F-4D97-AF65-F5344CB8AC3E}">
-        <p14:creationId xmlns:p14="http://schemas.microsoft.com/office/powerpoint/2010/main" val="821407823"/>
+        <p14:creationId xmlns:p14="http://schemas.microsoft.com/office/powerpoint/2010/main" val="2811856403"/>
       </p:ext>
     </p:extLst>
   </p:cSld>
@@ -5941,7 +7846,7 @@
             <a:pPr algn="ctr"/>
             <a:r>
               <a:rPr lang="en-US" dirty="0"/>
-              <a:t>On 01/22/2020, China was the first Country to report 500+ covid 19 cases to the World Health Organization.  As of 4/30/2020, the total confirmed cases in China was 102k </a:t>
+              <a:t>On 01/22/2020, China was the first Country to report 500+ covid 19 cases to the World Health Organization.  As of 4/30/2020, the total confirmed cases in China was 102k.   </a:t>
             </a:r>
           </a:p>
         </p:txBody>

</xml_diff>